<commit_message>
Adds diagram of Hard Links VS Symbolic (slide 8).
</commit_message>
<xml_diff>
--- a/ULI101-8.1.pptx
+++ b/ULI101-8.1.pptx
@@ -5,7 +5,7 @@
     <p:sldMasterId id="2147483855" r:id="rId1"/>
   </p:sldMasterIdLst>
   <p:notesMasterIdLst>
-    <p:notesMasterId r:id="rId12"/>
+    <p:notesMasterId r:id="rId13"/>
   </p:notesMasterIdLst>
   <p:sldIdLst>
     <p:sldId id="301" r:id="rId2"/>
@@ -15,9 +15,10 @@
     <p:sldId id="360" r:id="rId6"/>
     <p:sldId id="370" r:id="rId7"/>
     <p:sldId id="335" r:id="rId8"/>
-    <p:sldId id="361" r:id="rId9"/>
-    <p:sldId id="371" r:id="rId10"/>
-    <p:sldId id="362" r:id="rId11"/>
+    <p:sldId id="266" r:id="rId9"/>
+    <p:sldId id="361" r:id="rId10"/>
+    <p:sldId id="371" r:id="rId11"/>
+    <p:sldId id="362" r:id="rId12"/>
   </p:sldIdLst>
   <p:sldSz cx="12192000" cy="6858000"/>
   <p:notesSz cx="6858000" cy="9144000"/>
@@ -206,7 +207,7 @@
           <a:p>
             <a:fld id="{92107E4A-59D9-C648-BC62-133DA4EC414F}" type="datetimeFigureOut">
               <a:rPr lang="en-US" smtClean="0"/>
-              <a:t>4/29/2022</a:t>
+              <a:t>5/6/23</a:t>
             </a:fld>
             <a:endParaRPr lang="en-US"/>
           </a:p>
@@ -612,7 +613,7 @@
           <a:p>
             <a:fld id="{4AB1357F-A277-7442-BEE7-4FE250216E54}" type="datetimeFigureOut">
               <a:rPr lang="en-US" smtClean="0"/>
-              <a:t>4/29/2022</a:t>
+              <a:t>5/6/23</a:t>
             </a:fld>
             <a:endParaRPr lang="en-US"/>
           </a:p>
@@ -823,7 +824,7 @@
           <a:p>
             <a:fld id="{4AB1357F-A277-7442-BEE7-4FE250216E54}" type="datetimeFigureOut">
               <a:rPr lang="en-US" smtClean="0"/>
-              <a:t>4/29/2022</a:t>
+              <a:t>5/6/23</a:t>
             </a:fld>
             <a:endParaRPr lang="en-US"/>
           </a:p>
@@ -1038,7 +1039,7 @@
           <a:p>
             <a:fld id="{4AB1357F-A277-7442-BEE7-4FE250216E54}" type="datetimeFigureOut">
               <a:rPr lang="en-US" smtClean="0"/>
-              <a:t>4/29/2022</a:t>
+              <a:t>5/6/23</a:t>
             </a:fld>
             <a:endParaRPr lang="en-US"/>
           </a:p>
@@ -1239,7 +1240,7 @@
           <a:p>
             <a:fld id="{4AB1357F-A277-7442-BEE7-4FE250216E54}" type="datetimeFigureOut">
               <a:rPr lang="en-US" smtClean="0"/>
-              <a:t>4/29/2022</a:t>
+              <a:t>5/6/23</a:t>
             </a:fld>
             <a:endParaRPr lang="en-US"/>
           </a:p>
@@ -1518,7 +1519,7 @@
           <a:p>
             <a:fld id="{4AB1357F-A277-7442-BEE7-4FE250216E54}" type="datetimeFigureOut">
               <a:rPr lang="en-US" smtClean="0"/>
-              <a:t>4/29/2022</a:t>
+              <a:t>5/6/23</a:t>
             </a:fld>
             <a:endParaRPr lang="en-US"/>
           </a:p>
@@ -1786,7 +1787,7 @@
           <a:p>
             <a:fld id="{4AB1357F-A277-7442-BEE7-4FE250216E54}" type="datetimeFigureOut">
               <a:rPr lang="en-US" smtClean="0"/>
-              <a:t>4/29/2022</a:t>
+              <a:t>5/6/23</a:t>
             </a:fld>
             <a:endParaRPr lang="en-US"/>
           </a:p>
@@ -2202,7 +2203,7 @@
           <a:p>
             <a:fld id="{4AB1357F-A277-7442-BEE7-4FE250216E54}" type="datetimeFigureOut">
               <a:rPr lang="en-US" smtClean="0"/>
-              <a:t>4/29/2022</a:t>
+              <a:t>5/6/23</a:t>
             </a:fld>
             <a:endParaRPr lang="en-US"/>
           </a:p>
@@ -2351,7 +2352,7 @@
           <a:p>
             <a:fld id="{4AB1357F-A277-7442-BEE7-4FE250216E54}" type="datetimeFigureOut">
               <a:rPr lang="en-US" smtClean="0"/>
-              <a:t>4/29/2022</a:t>
+              <a:t>5/6/23</a:t>
             </a:fld>
             <a:endParaRPr lang="en-US"/>
           </a:p>
@@ -2477,7 +2478,7 @@
           <a:p>
             <a:fld id="{4AB1357F-A277-7442-BEE7-4FE250216E54}" type="datetimeFigureOut">
               <a:rPr lang="en-US" smtClean="0"/>
-              <a:t>4/29/2022</a:t>
+              <a:t>5/6/23</a:t>
             </a:fld>
             <a:endParaRPr lang="en-US"/>
           </a:p>
@@ -2728,7 +2729,7 @@
           <a:p>
             <a:fld id="{4AB1357F-A277-7442-BEE7-4FE250216E54}" type="datetimeFigureOut">
               <a:rPr lang="en-US" smtClean="0"/>
-              <a:t>4/29/2022</a:t>
+              <a:t>5/6/23</a:t>
             </a:fld>
             <a:endParaRPr lang="en-US"/>
           </a:p>
@@ -3173,7 +3174,7 @@
           <a:p>
             <a:fld id="{4AB1357F-A277-7442-BEE7-4FE250216E54}" type="datetimeFigureOut">
               <a:rPr lang="en-US" smtClean="0"/>
-              <a:t>4/29/2022</a:t>
+              <a:t>5/6/23</a:t>
             </a:fld>
             <a:endParaRPr lang="en-US"/>
           </a:p>
@@ -3500,7 +3501,7 @@
           <a:p>
             <a:fld id="{4AB1357F-A277-7442-BEE7-4FE250216E54}" type="datetimeFigureOut">
               <a:rPr lang="en-US" smtClean="0"/>
-              <a:t>4/29/2022</a:t>
+              <a:t>5/6/23</a:t>
             </a:fld>
             <a:endParaRPr lang="en-US"/>
           </a:p>
@@ -4004,7 +4005,7 @@
         </p:nvSpPr>
         <p:spPr>
           <a:xfrm>
-            <a:off x="1964987" y="802298"/>
+            <a:off x="1964987" y="938717"/>
             <a:ext cx="9089865" cy="3822329"/>
           </a:xfrm>
         </p:spPr>
@@ -4030,20 +4031,12 @@
               <a:rPr lang="en-US" sz="2400" dirty="0"/>
               <a:t>ULI101:  Introduction to Unix / Linux and the Internet</a:t>
             </a:r>
-            <a:r>
-              <a:rPr lang="en-US" dirty="0"/>
-              <a:t/>
-            </a:r>
             <a:br>
               <a:rPr lang="en-US" dirty="0"/>
             </a:br>
             <a:r>
               <a:rPr lang="en-US" sz="1200" dirty="0"/>
               <a:t> </a:t>
-            </a:r>
-            <a:r>
-              <a:rPr lang="en-US" dirty="0"/>
-              <a:t/>
             </a:r>
             <a:br>
               <a:rPr lang="en-US" dirty="0"/>
@@ -4074,10 +4067,6 @@
                 </a:solidFill>
               </a:rPr>
             </a:br>
-            <a:r>
-              <a:rPr lang="en-US" sz="2200" dirty="0"/>
-              <a:t/>
-            </a:r>
             <a:br>
               <a:rPr lang="en-US" sz="2200" dirty="0"/>
             </a:br>
@@ -4097,20 +4086,6 @@
               </a:rPr>
               <a:t>Linking files</a:t>
             </a:r>
-            <a:r>
-              <a:rPr lang="en-CA" dirty="0"/>
-              <a:t/>
-            </a:r>
-            <a:br>
-              <a:rPr lang="en-CA" dirty="0"/>
-            </a:br>
-            <a:r>
-              <a:rPr lang="en-US" sz="2400" dirty="0"/>
-              <a:t/>
-            </a:r>
-            <a:br>
-              <a:rPr lang="en-US" sz="2400" dirty="0"/>
-            </a:br>
             <a:endParaRPr lang="en-US" dirty="0"/>
           </a:p>
         </p:txBody>
@@ -4170,13 +4145,6 @@
   <p:clrMapOvr>
     <a:masterClrMapping/>
   </p:clrMapOvr>
-  <p:timing>
-    <p:tnLst>
-      <p:par>
-        <p:cTn id="1" dur="indefinite" restart="never" nodeType="tmRoot"/>
-      </p:par>
-    </p:tnLst>
-  </p:timing>
 </p:sld>
 </file>
 
@@ -4221,10 +4189,9 @@
           <a:lstStyle/>
           <a:p>
             <a:r>
-              <a:rPr lang="en-US" sz="2800" dirty="0" smtClean="0"/>
-              <a:t>HOMEWORK</a:t>
-            </a:r>
-            <a:endParaRPr lang="en-US" sz="3000" dirty="0"/>
+              <a:rPr lang="en-US" sz="2800" dirty="0"/>
+              <a:t>Linking files</a:t>
+            </a:r>
           </a:p>
         </p:txBody>
       </p:sp>
@@ -4247,6 +4214,293 @@
         <p:spPr>
           <a:xfrm>
             <a:off x="1451578" y="1706813"/>
+            <a:ext cx="8413391" cy="4755771"/>
+          </a:xfrm>
+        </p:spPr>
+        <p:txBody>
+          <a:bodyPr>
+            <a:normAutofit/>
+          </a:bodyPr>
+          <a:lstStyle/>
+          <a:p>
+            <a:pPr marL="0" indent="0">
+              <a:buNone/>
+            </a:pPr>
+            <a:r>
+              <a:rPr lang="en-CA" sz="2400" b="1" dirty="0"/>
+              <a:t>Instructor Demonstration</a:t>
+            </a:r>
+          </a:p>
+          <a:p>
+            <a:pPr marL="0" indent="0">
+              <a:buNone/>
+            </a:pPr>
+            <a:r>
+              <a:rPr lang="en-CA" dirty="0"/>
+              <a:t>Your instructor will now demonstrate how to create </a:t>
+            </a:r>
+            <a:r>
+              <a:rPr lang="en-CA" b="1" dirty="0"/>
+              <a:t>Symbolic (Soft) links</a:t>
+            </a:r>
+            <a:r>
+              <a:rPr lang="en-CA" dirty="0"/>
+              <a:t>.</a:t>
+            </a:r>
+            <a:br>
+              <a:rPr lang="en-CA" sz="1200" dirty="0"/>
+            </a:br>
+            <a:br>
+              <a:rPr lang="en-CA" sz="1200" dirty="0"/>
+            </a:br>
+            <a:endParaRPr lang="en-CA" sz="1200" dirty="0"/>
+          </a:p>
+          <a:p>
+            <a:endParaRPr lang="en-CA" sz="2400" dirty="0"/>
+          </a:p>
+          <a:p>
+            <a:endParaRPr lang="en-CA" sz="2400" dirty="0"/>
+          </a:p>
+          <a:p>
+            <a:pPr marL="0" indent="0">
+              <a:buNone/>
+            </a:pPr>
+            <a:endParaRPr lang="en-US" dirty="0"/>
+          </a:p>
+        </p:txBody>
+      </p:sp>
+      <p:pic>
+        <p:nvPicPr>
+          <p:cNvPr id="4" name="Picture 3" descr="A picture containing drawing&#10;&#10;Description automatically generated">
+            <a:extLst>
+              <a:ext uri="{FF2B5EF4-FFF2-40B4-BE49-F238E27FC236}">
+                <a16:creationId xmlns:a16="http://schemas.microsoft.com/office/drawing/2014/main" id="{8CD1DF9A-A995-1E4A-97CD-6982D99AF322}"/>
+              </a:ext>
+            </a:extLst>
+          </p:cNvPr>
+          <p:cNvPicPr>
+            <a:picLocks noChangeAspect="1"/>
+          </p:cNvPicPr>
+          <p:nvPr/>
+        </p:nvPicPr>
+        <p:blipFill>
+          <a:blip r:embed="rId2">
+            <a:extLst>
+              <a:ext uri="{837473B0-CC2E-450A-ABE3-18F120FF3D39}">
+                <a1611:picAttrSrcUrl xmlns:a1611="http://schemas.microsoft.com/office/drawing/2016/11/main" r:id="rId3"/>
+              </a:ext>
+            </a:extLst>
+          </a:blip>
+          <a:stretch>
+            <a:fillRect/>
+          </a:stretch>
+        </p:blipFill>
+        <p:spPr>
+          <a:xfrm>
+            <a:off x="10135411" y="975969"/>
+            <a:ext cx="1210020" cy="1210020"/>
+          </a:xfrm>
+          <a:prstGeom prst="rect">
+            <a:avLst/>
+          </a:prstGeom>
+        </p:spPr>
+      </p:pic>
+    </p:spTree>
+    <p:extLst>
+      <p:ext uri="{BB962C8B-B14F-4D97-AF65-F5344CB8AC3E}">
+        <p14:creationId xmlns:p14="http://schemas.microsoft.com/office/powerpoint/2010/main" val="2926248848"/>
+      </p:ext>
+    </p:extLst>
+  </p:cSld>
+  <p:clrMapOvr>
+    <a:masterClrMapping/>
+  </p:clrMapOvr>
+  <p:timing>
+    <p:tnLst>
+      <p:par>
+        <p:cTn id="1" dur="indefinite" restart="never" nodeType="tmRoot">
+          <p:childTnLst>
+            <p:seq concurrent="1" nextAc="seek">
+              <p:cTn id="2" dur="indefinite" nodeType="mainSeq">
+                <p:childTnLst>
+                  <p:par>
+                    <p:cTn id="3" fill="hold">
+                      <p:stCondLst>
+                        <p:cond delay="indefinite"/>
+                        <p:cond evt="onBegin" delay="0">
+                          <p:tn val="2"/>
+                        </p:cond>
+                      </p:stCondLst>
+                      <p:childTnLst>
+                        <p:par>
+                          <p:cTn id="4" fill="hold">
+                            <p:stCondLst>
+                              <p:cond delay="0"/>
+                            </p:stCondLst>
+                            <p:childTnLst>
+                              <p:par>
+                                <p:cTn id="5" presetID="1" presetClass="entr" presetSubtype="0" fill="hold" grpId="0" nodeType="withEffect">
+                                  <p:stCondLst>
+                                    <p:cond delay="0"/>
+                                  </p:stCondLst>
+                                  <p:childTnLst>
+                                    <p:set>
+                                      <p:cBhvr>
+                                        <p:cTn id="6" dur="1" fill="hold">
+                                          <p:stCondLst>
+                                            <p:cond delay="0"/>
+                                          </p:stCondLst>
+                                        </p:cTn>
+                                        <p:tgtEl>
+                                          <p:spTgt spid="3">
+                                            <p:txEl>
+                                              <p:pRg st="0" end="0"/>
+                                            </p:txEl>
+                                          </p:spTgt>
+                                        </p:tgtEl>
+                                        <p:attrNameLst>
+                                          <p:attrName>style.visibility</p:attrName>
+                                        </p:attrNameLst>
+                                      </p:cBhvr>
+                                      <p:to>
+                                        <p:strVal val="visible"/>
+                                      </p:to>
+                                    </p:set>
+                                  </p:childTnLst>
+                                </p:cTn>
+                              </p:par>
+                              <p:par>
+                                <p:cTn id="7" presetID="1" presetClass="entr" presetSubtype="0" fill="hold" grpId="0" nodeType="withEffect">
+                                  <p:stCondLst>
+                                    <p:cond delay="0"/>
+                                  </p:stCondLst>
+                                  <p:childTnLst>
+                                    <p:set>
+                                      <p:cBhvr>
+                                        <p:cTn id="8" dur="1" fill="hold">
+                                          <p:stCondLst>
+                                            <p:cond delay="0"/>
+                                          </p:stCondLst>
+                                        </p:cTn>
+                                        <p:tgtEl>
+                                          <p:spTgt spid="3">
+                                            <p:txEl>
+                                              <p:pRg st="1" end="1"/>
+                                            </p:txEl>
+                                          </p:spTgt>
+                                        </p:tgtEl>
+                                        <p:attrNameLst>
+                                          <p:attrName>style.visibility</p:attrName>
+                                        </p:attrNameLst>
+                                      </p:cBhvr>
+                                      <p:to>
+                                        <p:strVal val="visible"/>
+                                      </p:to>
+                                    </p:set>
+                                  </p:childTnLst>
+                                </p:cTn>
+                              </p:par>
+                            </p:childTnLst>
+                          </p:cTn>
+                        </p:par>
+                      </p:childTnLst>
+                    </p:cTn>
+                  </p:par>
+                </p:childTnLst>
+              </p:cTn>
+              <p:prevCondLst>
+                <p:cond evt="onPrev" delay="0">
+                  <p:tgtEl>
+                    <p:sldTgt/>
+                  </p:tgtEl>
+                </p:cond>
+              </p:prevCondLst>
+              <p:nextCondLst>
+                <p:cond evt="onNext" delay="0">
+                  <p:tgtEl>
+                    <p:sldTgt/>
+                  </p:tgtEl>
+                </p:cond>
+              </p:nextCondLst>
+            </p:seq>
+          </p:childTnLst>
+        </p:cTn>
+      </p:par>
+    </p:tnLst>
+    <p:bldLst>
+      <p:bldP spid="3" grpId="0" uiExpand="1" build="p"/>
+    </p:bldLst>
+  </p:timing>
+</p:sld>
+</file>
+
+<file path=ppt/slides/slide11.xml><?xml version="1.0" encoding="utf-8"?>
+<p:sld xmlns:a="http://schemas.openxmlformats.org/drawingml/2006/main" xmlns:r="http://schemas.openxmlformats.org/officeDocument/2006/relationships" xmlns:p="http://schemas.openxmlformats.org/presentationml/2006/main" showMasterSp="0">
+  <p:cSld>
+    <p:spTree>
+      <p:nvGrpSpPr>
+        <p:cNvPr id="1" name=""/>
+        <p:cNvGrpSpPr/>
+        <p:nvPr/>
+      </p:nvGrpSpPr>
+      <p:grpSpPr>
+        <a:xfrm>
+          <a:off x="0" y="0"/>
+          <a:ext cx="0" cy="0"/>
+          <a:chOff x="0" y="0"/>
+          <a:chExt cx="0" cy="0"/>
+        </a:xfrm>
+      </p:grpSpPr>
+      <p:sp>
+        <p:nvSpPr>
+          <p:cNvPr id="2" name="Title 1">
+            <a:extLst>
+              <a:ext uri="{FF2B5EF4-FFF2-40B4-BE49-F238E27FC236}">
+                <a16:creationId xmlns:a16="http://schemas.microsoft.com/office/drawing/2014/main" id="{303829AC-DEC4-1147-BF51-3849E59AC39E}"/>
+              </a:ext>
+            </a:extLst>
+          </p:cNvPr>
+          <p:cNvSpPr>
+            <a:spLocks noGrp="1"/>
+          </p:cNvSpPr>
+          <p:nvPr>
+            <p:ph type="title"/>
+          </p:nvPr>
+        </p:nvSpPr>
+        <p:spPr/>
+        <p:txBody>
+          <a:bodyPr>
+            <a:normAutofit/>
+          </a:bodyPr>
+          <a:lstStyle/>
+          <a:p>
+            <a:r>
+              <a:rPr lang="en-US" sz="2800" dirty="0"/>
+              <a:t>HOMEWORK</a:t>
+            </a:r>
+            <a:endParaRPr lang="en-US" sz="3000" dirty="0"/>
+          </a:p>
+        </p:txBody>
+      </p:sp>
+      <p:sp>
+        <p:nvSpPr>
+          <p:cNvPr id="3" name="Content Placeholder 2">
+            <a:extLst>
+              <a:ext uri="{FF2B5EF4-FFF2-40B4-BE49-F238E27FC236}">
+                <a16:creationId xmlns:a16="http://schemas.microsoft.com/office/drawing/2014/main" id="{99DF4C7A-3854-7B4B-8D4F-4AD959A565DC}"/>
+              </a:ext>
+            </a:extLst>
+          </p:cNvPr>
+          <p:cNvSpPr>
+            <a:spLocks noGrp="1"/>
+          </p:cNvSpPr>
+          <p:nvPr>
+            <p:ph idx="1"/>
+          </p:nvPr>
+        </p:nvSpPr>
+        <p:spPr>
+          <a:xfrm>
+            <a:off x="1451579" y="1430367"/>
             <a:ext cx="10136684" cy="4755771"/>
           </a:xfrm>
         </p:spPr>
@@ -4269,19 +4523,15 @@
               <a:buNone/>
             </a:pPr>
             <a:r>
-              <a:rPr lang="en-CA" dirty="0" smtClean="0"/>
+              <a:rPr lang="en-CA" dirty="0"/>
               <a:t>Perform </a:t>
             </a:r>
             <a:r>
               <a:rPr lang="en-CA" b="1" dirty="0"/>
-              <a:t>Week 8  Tutorial</a:t>
-            </a:r>
-            <a:r>
-              <a:rPr lang="en-CA" b="1" dirty="0" smtClean="0"/>
-              <a:t>:</a:t>
+              <a:t>Week 8  Tutorial:</a:t>
             </a:r>
             <a:br>
-              <a:rPr lang="en-CA" b="1" dirty="0" smtClean="0"/>
+              <a:rPr lang="en-CA" b="1" dirty="0"/>
             </a:br>
             <a:r>
               <a:rPr lang="en-US" sz="1600" b="1" spc="-1" dirty="0">
@@ -4289,23 +4539,7 @@
                   <a:srgbClr val="000000"/>
                 </a:solidFill>
               </a:rPr>
-              <a:t>(Due: Friday Week </a:t>
-            </a:r>
-            <a:r>
-              <a:rPr lang="en-US" sz="1600" b="1" spc="-1" dirty="0" smtClean="0">
-                <a:solidFill>
-                  <a:srgbClr val="000000"/>
-                </a:solidFill>
-              </a:rPr>
-              <a:t>9 </a:t>
-            </a:r>
-            <a:r>
-              <a:rPr lang="en-US" sz="1600" b="1" spc="-1" dirty="0">
-                <a:solidFill>
-                  <a:srgbClr val="000000"/>
-                </a:solidFill>
-              </a:rPr>
-              <a:t>@ midnight for a 2% grade)</a:t>
+              <a:t>(Due: Friday Week 9 @ midnight for a 2% grade)</a:t>
             </a:r>
             <a:r>
               <a:rPr lang="en-US" sz="1600" spc="-1" dirty="0">
@@ -4315,10 +4549,6 @@
               </a:rPr>
               <a:t>:</a:t>
             </a:r>
-            <a:r>
-              <a:rPr lang="en-CA" sz="1600" b="1" dirty="0"/>
-              <a:t/>
-            </a:r>
             <a:br>
               <a:rPr lang="en-CA" sz="1600" b="1" dirty="0"/>
             </a:br>
@@ -4332,13 +4562,6 @@
               </a:rPr>
               <a:t>INVESTIGATION 1: LINKING FILES</a:t>
             </a:r>
-            <a:r>
-              <a:rPr lang="en-CA" dirty="0"/>
-              <a:t/>
-            </a:r>
-            <a:br>
-              <a:rPr lang="en-CA" dirty="0"/>
-            </a:br>
             <a:endParaRPr lang="en-CA" dirty="0"/>
           </a:p>
           <a:p>
@@ -4360,10 +4583,6 @@
             <a:r>
               <a:rPr lang="en-CA" dirty="0"/>
               <a:t>)</a:t>
-            </a:r>
-            <a:r>
-              <a:rPr lang="en-CA" sz="1600" dirty="0"/>
-              <a:t/>
             </a:r>
             <a:br>
               <a:rPr lang="en-CA" sz="1600" dirty="0"/>
@@ -4667,7 +4886,7 @@
         <p:spPr>
           <a:xfrm>
             <a:off x="1451578" y="1706813"/>
-            <a:ext cx="9603275" cy="5064690"/>
+            <a:ext cx="9603275" cy="3641364"/>
           </a:xfrm>
         </p:spPr>
         <p:txBody>
@@ -4708,9 +4927,6 @@
               <a:rPr lang="en-US" dirty="0"/>
               <a:t>Symbolic Links / Demonstration</a:t>
             </a:r>
-            <a:br>
-              <a:rPr lang="en-US" dirty="0"/>
-            </a:br>
             <a:endParaRPr lang="en-US" b="1" dirty="0"/>
           </a:p>
           <a:p>
@@ -4733,13 +4949,8 @@
             <a:pPr lvl="1"/>
             <a:r>
               <a:rPr lang="en-US" dirty="0"/>
-              <a:t>Review Questions (Questions 1 – 2</a:t>
-            </a:r>
-            <a:r>
-              <a:rPr lang="en-US" dirty="0" smtClean="0"/>
-              <a:t>)</a:t>
-            </a:r>
-            <a:endParaRPr lang="en-US" dirty="0"/>
+              <a:t>Review Questions (Questions 1 – 2)</a:t>
+            </a:r>
           </a:p>
         </p:txBody>
       </p:sp>
@@ -5108,13 +5319,13 @@
         </p:nvSpPr>
         <p:spPr>
           <a:xfrm>
-            <a:off x="1451578" y="1706813"/>
+            <a:off x="1451579" y="1403564"/>
             <a:ext cx="7353755" cy="4755771"/>
           </a:xfrm>
         </p:spPr>
         <p:txBody>
           <a:bodyPr>
-            <a:normAutofit fontScale="85000" lnSpcReduction="10000"/>
+            <a:normAutofit/>
           </a:bodyPr>
           <a:lstStyle/>
           <a:p>
@@ -5129,13 +5340,6 @@
               <a:rPr lang="en-CA" sz="2400" b="1" dirty="0"/>
               <a:t> (index) Number of a File:</a:t>
             </a:r>
-            <a:r>
-              <a:rPr lang="en-CA" i="1" dirty="0"/>
-              <a:t/>
-            </a:r>
-            <a:br>
-              <a:rPr lang="en-CA" i="1" dirty="0"/>
-            </a:br>
             <a:endParaRPr lang="en-CA" i="1" dirty="0"/>
           </a:p>
           <a:p>
@@ -5173,6 +5377,124 @@
             <a:r>
               <a:rPr lang="en-CA" dirty="0"/>
               <a:t> for each file on the Unix / Linux file system.</a:t>
+            </a:r>
+          </a:p>
+          <a:p>
+            <a:pPr marL="0" indent="0">
+              <a:buNone/>
+            </a:pPr>
+            <a:r>
+              <a:rPr lang="en-CA" dirty="0"/>
+              <a:t>The </a:t>
+            </a:r>
+            <a:r>
+              <a:rPr lang="en-CA" dirty="0" err="1"/>
+              <a:t>i</a:t>
+            </a:r>
+            <a:r>
+              <a:rPr lang="en-CA" dirty="0"/>
+              <a:t>-node is an </a:t>
+            </a:r>
+            <a:r>
+              <a:rPr lang="en-CA" b="1" dirty="0"/>
+              <a:t>index </a:t>
+            </a:r>
+            <a:r>
+              <a:rPr lang="en-CA" dirty="0"/>
+              <a:t>(</a:t>
+            </a:r>
+            <a:r>
+              <a:rPr lang="en-CA" b="1" dirty="0"/>
+              <a:t>data structure</a:t>
+            </a:r>
+            <a:r>
+              <a:rPr lang="en-CA" dirty="0"/>
+              <a:t>) that provides information about the file such as if the file is a </a:t>
+            </a:r>
+            <a:r>
+              <a:rPr lang="en-CA" b="1" dirty="0"/>
+              <a:t>directory</a:t>
+            </a:r>
+            <a:r>
+              <a:rPr lang="en-CA" dirty="0"/>
+              <a:t> or </a:t>
+            </a:r>
+            <a:r>
+              <a:rPr lang="en-CA" b="1" dirty="0"/>
+              <a:t>regular file</a:t>
+            </a:r>
+            <a:r>
+              <a:rPr lang="en-CA" dirty="0"/>
+              <a:t>, etc.</a:t>
+            </a:r>
+          </a:p>
+          <a:p>
+            <a:pPr marL="0" indent="0">
+              <a:buNone/>
+            </a:pPr>
+            <a:r>
+              <a:rPr lang="en-CA" dirty="0"/>
+              <a:t>Referring to the diagram below, issuing the </a:t>
+            </a:r>
+            <a:r>
+              <a:rPr lang="en-CA" b="1" dirty="0"/>
+              <a:t>ls</a:t>
+            </a:r>
+            <a:r>
+              <a:rPr lang="en-CA" dirty="0"/>
+              <a:t> command using the </a:t>
+            </a:r>
+            <a:r>
+              <a:rPr lang="en-CA" b="1" dirty="0"/>
+              <a:t>-</a:t>
+            </a:r>
+            <a:r>
+              <a:rPr lang="en-CA" b="1" dirty="0" err="1"/>
+              <a:t>i</a:t>
+            </a:r>
+            <a:r>
+              <a:rPr lang="en-CA" dirty="0"/>
+              <a:t> option displays the </a:t>
+            </a:r>
+            <a:r>
+              <a:rPr lang="en-CA" b="1" dirty="0" err="1"/>
+              <a:t>i</a:t>
+            </a:r>
+            <a:r>
+              <a:rPr lang="en-CA" b="1" dirty="0"/>
+              <a:t>-node</a:t>
+            </a:r>
+            <a:r>
+              <a:rPr lang="en-CA" dirty="0"/>
+              <a:t> number for each file. You can see that </a:t>
+            </a:r>
+            <a:r>
+              <a:rPr lang="en-CA" u="sng" dirty="0"/>
+              <a:t>each</a:t>
+            </a:r>
+            <a:r>
+              <a:rPr lang="en-CA" dirty="0"/>
+              <a:t> file has its own </a:t>
+            </a:r>
+            <a:r>
+              <a:rPr lang="en-CA" b="1" dirty="0"/>
+              <a:t>unique</a:t>
+            </a:r>
+            <a:r>
+              <a:rPr lang="en-CA" i="1" dirty="0"/>
+              <a:t> </a:t>
+            </a:r>
+            <a:r>
+              <a:rPr lang="en-CA" i="1" dirty="0" err="1"/>
+              <a:t>i</a:t>
+            </a:r>
+            <a:r>
+              <a:rPr lang="en-CA" i="1" dirty="0"/>
+              <a:t>-node </a:t>
+            </a:r>
+            <a:r>
+              <a:rPr lang="en-CA" dirty="0"/>
+              <a:t>number in the file system.</a:t>
             </a:r>
             <a:br>
               <a:rPr lang="en-CA" dirty="0"/>
@@ -5183,143 +5505,6 @@
             <a:pPr marL="0" indent="0">
               <a:buNone/>
             </a:pPr>
-            <a:r>
-              <a:rPr lang="en-CA" dirty="0"/>
-              <a:t>The </a:t>
-            </a:r>
-            <a:r>
-              <a:rPr lang="en-CA" dirty="0" err="1"/>
-              <a:t>i</a:t>
-            </a:r>
-            <a:r>
-              <a:rPr lang="en-CA" dirty="0"/>
-              <a:t>-node is an </a:t>
-            </a:r>
-            <a:r>
-              <a:rPr lang="en-CA" b="1" dirty="0"/>
-              <a:t>index </a:t>
-            </a:r>
-            <a:r>
-              <a:rPr lang="en-CA" dirty="0"/>
-              <a:t>(</a:t>
-            </a:r>
-            <a:r>
-              <a:rPr lang="en-CA" b="1" dirty="0"/>
-              <a:t>data structure</a:t>
-            </a:r>
-            <a:r>
-              <a:rPr lang="en-CA" dirty="0"/>
-              <a:t>) that provides information about the </a:t>
-            </a:r>
-            <a:br>
-              <a:rPr lang="en-CA" dirty="0"/>
-            </a:br>
-            <a:r>
-              <a:rPr lang="en-CA" dirty="0"/>
-              <a:t>file such as if the file is a </a:t>
-            </a:r>
-            <a:r>
-              <a:rPr lang="en-CA" b="1" dirty="0"/>
-              <a:t>directory</a:t>
-            </a:r>
-            <a:r>
-              <a:rPr lang="en-CA" dirty="0"/>
-              <a:t> or </a:t>
-            </a:r>
-            <a:r>
-              <a:rPr lang="en-CA" b="1" dirty="0"/>
-              <a:t>regular file</a:t>
-            </a:r>
-            <a:r>
-              <a:rPr lang="en-CA" dirty="0"/>
-              <a:t>, etc.</a:t>
-            </a:r>
-            <a:br>
-              <a:rPr lang="en-CA" dirty="0"/>
-            </a:br>
-            <a:endParaRPr lang="en-CA" dirty="0"/>
-          </a:p>
-          <a:p>
-            <a:pPr marL="0" indent="0">
-              <a:buNone/>
-            </a:pPr>
-            <a:r>
-              <a:rPr lang="en-CA" dirty="0"/>
-              <a:t>Referring to the diagram below, issuing the </a:t>
-            </a:r>
-            <a:r>
-              <a:rPr lang="en-CA" b="1" dirty="0"/>
-              <a:t>ls</a:t>
-            </a:r>
-            <a:r>
-              <a:rPr lang="en-CA" dirty="0"/>
-              <a:t> command using the </a:t>
-            </a:r>
-            <a:r>
-              <a:rPr lang="en-CA" b="1" dirty="0"/>
-              <a:t>-</a:t>
-            </a:r>
-            <a:r>
-              <a:rPr lang="en-CA" b="1" dirty="0" err="1"/>
-              <a:t>i</a:t>
-            </a:r>
-            <a:r>
-              <a:rPr lang="en-CA" dirty="0"/>
-              <a:t> option displays the </a:t>
-            </a:r>
-            <a:r>
-              <a:rPr lang="en-CA" b="1" dirty="0" err="1"/>
-              <a:t>i</a:t>
-            </a:r>
-            <a:r>
-              <a:rPr lang="en-CA" b="1" dirty="0"/>
-              <a:t>-node</a:t>
-            </a:r>
-            <a:r>
-              <a:rPr lang="en-CA" dirty="0"/>
-              <a:t> number for each file. You can see that </a:t>
-            </a:r>
-            <a:r>
-              <a:rPr lang="en-CA" u="sng" dirty="0"/>
-              <a:t>each</a:t>
-            </a:r>
-            <a:r>
-              <a:rPr lang="en-CA" dirty="0"/>
-              <a:t> file has its own </a:t>
-            </a:r>
-            <a:r>
-              <a:rPr lang="en-CA" b="1" dirty="0"/>
-              <a:t>unique</a:t>
-            </a:r>
-            <a:r>
-              <a:rPr lang="en-CA" i="1" dirty="0"/>
-              <a:t> </a:t>
-            </a:r>
-            <a:r>
-              <a:rPr lang="en-CA" i="1" dirty="0" err="1"/>
-              <a:t>i</a:t>
-            </a:r>
-            <a:r>
-              <a:rPr lang="en-CA" i="1" dirty="0"/>
-              <a:t>-node </a:t>
-            </a:r>
-            <a:r>
-              <a:rPr lang="en-CA" dirty="0"/>
-              <a:t>number in the file system.</a:t>
-            </a:r>
-            <a:br>
-              <a:rPr lang="en-CA" dirty="0"/>
-            </a:br>
-            <a:endParaRPr lang="en-CA" dirty="0"/>
-          </a:p>
-          <a:p>
-            <a:pPr marL="0" indent="0">
-              <a:buNone/>
-            </a:pPr>
-            <a:r>
-              <a:rPr lang="en-CA" dirty="0"/>
-              <a:t/>
-            </a:r>
             <a:br>
               <a:rPr lang="en-CA" dirty="0"/>
             </a:br>
@@ -5349,7 +5534,7 @@
         </p:blipFill>
         <p:spPr>
           <a:xfrm>
-            <a:off x="1451577" y="5462541"/>
+            <a:off x="2096883" y="5111666"/>
             <a:ext cx="6063141" cy="1181880"/>
           </a:xfrm>
           <a:prstGeom prst="rect">
@@ -5380,7 +5565,7 @@
           <a:blip r:embed="rId3">
             <a:extLst>
               <a:ext uri="{837473B0-CC2E-450A-ABE3-18F120FF3D39}">
-                <a1611:picAttrSrcUrl xmlns="" xmlns:a1611="http://schemas.microsoft.com/office/drawing/2016/11/main" r:id="rId4"/>
+                <a1611:picAttrSrcUrl xmlns:a1611="http://schemas.microsoft.com/office/drawing/2016/11/main" r:id="rId4"/>
               </a:ext>
             </a:extLst>
           </a:blip>
@@ -5402,6 +5587,511 @@
     <p:extLst>
       <p:ext uri="{BB962C8B-B14F-4D97-AF65-F5344CB8AC3E}">
         <p14:creationId xmlns:p14="http://schemas.microsoft.com/office/powerpoint/2010/main" val="966407910"/>
+      </p:ext>
+    </p:extLst>
+  </p:cSld>
+  <p:clrMapOvr>
+    <a:masterClrMapping/>
+  </p:clrMapOvr>
+  <p:timing>
+    <p:tnLst>
+      <p:par>
+        <p:cTn id="1" dur="indefinite" restart="never" nodeType="tmRoot">
+          <p:childTnLst>
+            <p:seq concurrent="1" nextAc="seek">
+              <p:cTn id="2" dur="indefinite" nodeType="mainSeq">
+                <p:childTnLst>
+                  <p:par>
+                    <p:cTn id="3" fill="hold">
+                      <p:stCondLst>
+                        <p:cond delay="indefinite"/>
+                        <p:cond evt="onBegin" delay="0">
+                          <p:tn val="2"/>
+                        </p:cond>
+                      </p:stCondLst>
+                      <p:childTnLst>
+                        <p:par>
+                          <p:cTn id="4" fill="hold">
+                            <p:stCondLst>
+                              <p:cond delay="0"/>
+                            </p:stCondLst>
+                            <p:childTnLst>
+                              <p:par>
+                                <p:cTn id="5" presetID="1" presetClass="entr" presetSubtype="0" fill="hold" grpId="0" nodeType="withEffect">
+                                  <p:stCondLst>
+                                    <p:cond delay="0"/>
+                                  </p:stCondLst>
+                                  <p:childTnLst>
+                                    <p:set>
+                                      <p:cBhvr>
+                                        <p:cTn id="6" dur="1" fill="hold">
+                                          <p:stCondLst>
+                                            <p:cond delay="0"/>
+                                          </p:stCondLst>
+                                        </p:cTn>
+                                        <p:tgtEl>
+                                          <p:spTgt spid="3">
+                                            <p:txEl>
+                                              <p:pRg st="0" end="0"/>
+                                            </p:txEl>
+                                          </p:spTgt>
+                                        </p:tgtEl>
+                                        <p:attrNameLst>
+                                          <p:attrName>style.visibility</p:attrName>
+                                        </p:attrNameLst>
+                                      </p:cBhvr>
+                                      <p:to>
+                                        <p:strVal val="visible"/>
+                                      </p:to>
+                                    </p:set>
+                                  </p:childTnLst>
+                                </p:cTn>
+                              </p:par>
+                              <p:par>
+                                <p:cTn id="7" presetID="1" presetClass="entr" presetSubtype="0" fill="hold" grpId="0" nodeType="withEffect">
+                                  <p:stCondLst>
+                                    <p:cond delay="0"/>
+                                  </p:stCondLst>
+                                  <p:childTnLst>
+                                    <p:set>
+                                      <p:cBhvr>
+                                        <p:cTn id="8" dur="1" fill="hold">
+                                          <p:stCondLst>
+                                            <p:cond delay="0"/>
+                                          </p:stCondLst>
+                                        </p:cTn>
+                                        <p:tgtEl>
+                                          <p:spTgt spid="3">
+                                            <p:txEl>
+                                              <p:pRg st="1" end="1"/>
+                                            </p:txEl>
+                                          </p:spTgt>
+                                        </p:tgtEl>
+                                        <p:attrNameLst>
+                                          <p:attrName>style.visibility</p:attrName>
+                                        </p:attrNameLst>
+                                      </p:cBhvr>
+                                      <p:to>
+                                        <p:strVal val="visible"/>
+                                      </p:to>
+                                    </p:set>
+                                  </p:childTnLst>
+                                </p:cTn>
+                              </p:par>
+                              <p:par>
+                                <p:cTn id="9" presetID="1" presetClass="entr" presetSubtype="0" fill="hold" grpId="0" nodeType="withEffect">
+                                  <p:stCondLst>
+                                    <p:cond delay="0"/>
+                                  </p:stCondLst>
+                                  <p:childTnLst>
+                                    <p:set>
+                                      <p:cBhvr>
+                                        <p:cTn id="10" dur="1" fill="hold">
+                                          <p:stCondLst>
+                                            <p:cond delay="0"/>
+                                          </p:stCondLst>
+                                        </p:cTn>
+                                        <p:tgtEl>
+                                          <p:spTgt spid="3">
+                                            <p:txEl>
+                                              <p:pRg st="2" end="2"/>
+                                            </p:txEl>
+                                          </p:spTgt>
+                                        </p:tgtEl>
+                                        <p:attrNameLst>
+                                          <p:attrName>style.visibility</p:attrName>
+                                        </p:attrNameLst>
+                                      </p:cBhvr>
+                                      <p:to>
+                                        <p:strVal val="visible"/>
+                                      </p:to>
+                                    </p:set>
+                                  </p:childTnLst>
+                                </p:cTn>
+                              </p:par>
+                            </p:childTnLst>
+                          </p:cTn>
+                        </p:par>
+                      </p:childTnLst>
+                    </p:cTn>
+                  </p:par>
+                  <p:par>
+                    <p:cTn id="11" fill="hold">
+                      <p:stCondLst>
+                        <p:cond delay="indefinite"/>
+                      </p:stCondLst>
+                      <p:childTnLst>
+                        <p:par>
+                          <p:cTn id="12" fill="hold">
+                            <p:stCondLst>
+                              <p:cond delay="0"/>
+                            </p:stCondLst>
+                            <p:childTnLst>
+                              <p:par>
+                                <p:cTn id="13" presetID="1" presetClass="entr" presetSubtype="0" fill="hold" grpId="0" nodeType="clickEffect">
+                                  <p:stCondLst>
+                                    <p:cond delay="0"/>
+                                  </p:stCondLst>
+                                  <p:childTnLst>
+                                    <p:set>
+                                      <p:cBhvr>
+                                        <p:cTn id="14" dur="1" fill="hold">
+                                          <p:stCondLst>
+                                            <p:cond delay="0"/>
+                                          </p:stCondLst>
+                                        </p:cTn>
+                                        <p:tgtEl>
+                                          <p:spTgt spid="3">
+                                            <p:txEl>
+                                              <p:pRg st="3" end="3"/>
+                                            </p:txEl>
+                                          </p:spTgt>
+                                        </p:tgtEl>
+                                        <p:attrNameLst>
+                                          <p:attrName>style.visibility</p:attrName>
+                                        </p:attrNameLst>
+                                      </p:cBhvr>
+                                      <p:to>
+                                        <p:strVal val="visible"/>
+                                      </p:to>
+                                    </p:set>
+                                  </p:childTnLst>
+                                </p:cTn>
+                              </p:par>
+                              <p:par>
+                                <p:cTn id="15" presetID="1" presetClass="entr" presetSubtype="0" fill="hold" nodeType="withEffect">
+                                  <p:stCondLst>
+                                    <p:cond delay="0"/>
+                                  </p:stCondLst>
+                                  <p:childTnLst>
+                                    <p:set>
+                                      <p:cBhvr>
+                                        <p:cTn id="16" dur="1" fill="hold">
+                                          <p:stCondLst>
+                                            <p:cond delay="0"/>
+                                          </p:stCondLst>
+                                        </p:cTn>
+                                        <p:tgtEl>
+                                          <p:spTgt spid="5"/>
+                                        </p:tgtEl>
+                                        <p:attrNameLst>
+                                          <p:attrName>style.visibility</p:attrName>
+                                        </p:attrNameLst>
+                                      </p:cBhvr>
+                                      <p:to>
+                                        <p:strVal val="visible"/>
+                                      </p:to>
+                                    </p:set>
+                                  </p:childTnLst>
+                                </p:cTn>
+                              </p:par>
+                            </p:childTnLst>
+                          </p:cTn>
+                        </p:par>
+                      </p:childTnLst>
+                    </p:cTn>
+                  </p:par>
+                </p:childTnLst>
+              </p:cTn>
+              <p:prevCondLst>
+                <p:cond evt="onPrev" delay="0">
+                  <p:tgtEl>
+                    <p:sldTgt/>
+                  </p:tgtEl>
+                </p:cond>
+              </p:prevCondLst>
+              <p:nextCondLst>
+                <p:cond evt="onNext" delay="0">
+                  <p:tgtEl>
+                    <p:sldTgt/>
+                  </p:tgtEl>
+                </p:cond>
+              </p:nextCondLst>
+            </p:seq>
+          </p:childTnLst>
+        </p:cTn>
+      </p:par>
+    </p:tnLst>
+    <p:bldLst>
+      <p:bldP spid="3" grpId="0" uiExpand="1" build="p"/>
+    </p:bldLst>
+  </p:timing>
+</p:sld>
+</file>
+
+<file path=ppt/slides/slide4.xml><?xml version="1.0" encoding="utf-8"?>
+<p:sld xmlns:a="http://schemas.openxmlformats.org/drawingml/2006/main" xmlns:r="http://schemas.openxmlformats.org/officeDocument/2006/relationships" xmlns:p="http://schemas.openxmlformats.org/presentationml/2006/main" showMasterSp="0">
+  <p:cSld>
+    <p:spTree>
+      <p:nvGrpSpPr>
+        <p:cNvPr id="1" name=""/>
+        <p:cNvGrpSpPr/>
+        <p:nvPr/>
+      </p:nvGrpSpPr>
+      <p:grpSpPr>
+        <a:xfrm>
+          <a:off x="0" y="0"/>
+          <a:ext cx="0" cy="0"/>
+          <a:chOff x="0" y="0"/>
+          <a:chExt cx="0" cy="0"/>
+        </a:xfrm>
+      </p:grpSpPr>
+      <p:sp>
+        <p:nvSpPr>
+          <p:cNvPr id="2" name="Title 1">
+            <a:extLst>
+              <a:ext uri="{FF2B5EF4-FFF2-40B4-BE49-F238E27FC236}">
+                <a16:creationId xmlns:a16="http://schemas.microsoft.com/office/drawing/2014/main" id="{303829AC-DEC4-1147-BF51-3849E59AC39E}"/>
+              </a:ext>
+            </a:extLst>
+          </p:cNvPr>
+          <p:cNvSpPr>
+            <a:spLocks noGrp="1"/>
+          </p:cNvSpPr>
+          <p:nvPr>
+            <p:ph type="title"/>
+          </p:nvPr>
+        </p:nvSpPr>
+        <p:spPr/>
+        <p:txBody>
+          <a:bodyPr>
+            <a:normAutofit/>
+          </a:bodyPr>
+          <a:lstStyle/>
+          <a:p>
+            <a:r>
+              <a:rPr lang="en-US" sz="2800" dirty="0"/>
+              <a:t>Linking files</a:t>
+            </a:r>
+            <a:endParaRPr lang="en-US" sz="3000" dirty="0"/>
+          </a:p>
+        </p:txBody>
+      </p:sp>
+      <p:sp>
+        <p:nvSpPr>
+          <p:cNvPr id="3" name="Content Placeholder 2">
+            <a:extLst>
+              <a:ext uri="{FF2B5EF4-FFF2-40B4-BE49-F238E27FC236}">
+                <a16:creationId xmlns:a16="http://schemas.microsoft.com/office/drawing/2014/main" id="{99DF4C7A-3854-7B4B-8D4F-4AD959A565DC}"/>
+              </a:ext>
+            </a:extLst>
+          </p:cNvPr>
+          <p:cNvSpPr>
+            <a:spLocks noGrp="1"/>
+          </p:cNvSpPr>
+          <p:nvPr>
+            <p:ph idx="1"/>
+          </p:nvPr>
+        </p:nvSpPr>
+        <p:spPr>
+          <a:xfrm>
+            <a:off x="1451579" y="1462264"/>
+            <a:ext cx="6153187" cy="4755771"/>
+          </a:xfrm>
+        </p:spPr>
+        <p:txBody>
+          <a:bodyPr>
+            <a:normAutofit fontScale="85000" lnSpcReduction="10000"/>
+          </a:bodyPr>
+          <a:lstStyle/>
+          <a:p>
+            <a:pPr marL="0" indent="0">
+              <a:buNone/>
+            </a:pPr>
+            <a:r>
+              <a:rPr lang="en-CA" sz="2800" b="1" dirty="0"/>
+              <a:t>Hard Links</a:t>
+            </a:r>
+          </a:p>
+          <a:p>
+            <a:pPr marL="0" indent="0">
+              <a:buNone/>
+            </a:pPr>
+            <a:r>
+              <a:rPr lang="en-CA" dirty="0"/>
+              <a:t>A </a:t>
+            </a:r>
+            <a:r>
+              <a:rPr lang="en-CA" b="1" dirty="0"/>
+              <a:t>Hard link</a:t>
+            </a:r>
+            <a:r>
+              <a:rPr lang="en-CA" dirty="0"/>
+              <a:t> is a </a:t>
+            </a:r>
+            <a:r>
+              <a:rPr lang="en-CA" b="1" dirty="0"/>
+              <a:t>reference</a:t>
+            </a:r>
+            <a:r>
+              <a:rPr lang="en-CA" dirty="0"/>
+              <a:t> to the </a:t>
+            </a:r>
+            <a:r>
+              <a:rPr lang="en-CA" b="1" dirty="0"/>
+              <a:t>same index </a:t>
+            </a:r>
+            <a:r>
+              <a:rPr lang="en-CA" dirty="0"/>
+              <a:t>on a file system. </a:t>
+            </a:r>
+            <a:br>
+              <a:rPr lang="en-CA" dirty="0"/>
+            </a:br>
+            <a:r>
+              <a:rPr lang="en-CA" dirty="0"/>
+              <a:t>It does this by creating a file that </a:t>
+            </a:r>
+            <a:r>
+              <a:rPr lang="en-CA" b="1" dirty="0"/>
+              <a:t>shares the same </a:t>
+            </a:r>
+            <a:r>
+              <a:rPr lang="en-CA" b="1" dirty="0" err="1"/>
+              <a:t>i</a:t>
+            </a:r>
+            <a:r>
+              <a:rPr lang="en-CA" b="1" dirty="0"/>
+              <a:t>-node number </a:t>
+            </a:r>
+            <a:r>
+              <a:rPr lang="en-CA" dirty="0"/>
+              <a:t>with the other file.</a:t>
+            </a:r>
+          </a:p>
+          <a:p>
+            <a:pPr marL="0" indent="0">
+              <a:buNone/>
+            </a:pPr>
+            <a:r>
+              <a:rPr lang="en-CA" dirty="0"/>
+              <a:t>An </a:t>
+            </a:r>
+            <a:r>
+              <a:rPr lang="en-CA" b="1" dirty="0"/>
+              <a:t>advantage </a:t>
+            </a:r>
+            <a:r>
+              <a:rPr lang="en-CA" dirty="0"/>
+              <a:t>of using hard links is that if one hard link remains (even if original file has been removed), </a:t>
+            </a:r>
+            <a:r>
+              <a:rPr lang="en-CA" b="1" dirty="0"/>
+              <a:t>the data in that hard-linked file is NOT lost</a:t>
+            </a:r>
+            <a:r>
+              <a:rPr lang="en-CA" dirty="0"/>
+              <a:t>.  Also, any change to each file will be reflected in any hard-linked file which is useful for </a:t>
+            </a:r>
+            <a:r>
+              <a:rPr lang="en-CA" b="1" dirty="0"/>
+              <a:t>backups</a:t>
+            </a:r>
+            <a:r>
+              <a:rPr lang="en-CA" dirty="0"/>
+              <a:t>.</a:t>
+            </a:r>
+          </a:p>
+          <a:p>
+            <a:pPr marL="0" indent="0">
+              <a:buNone/>
+            </a:pPr>
+            <a:r>
+              <a:rPr lang="en-CA" b="1" dirty="0"/>
+              <a:t>Limitations</a:t>
+            </a:r>
+            <a:r>
+              <a:rPr lang="en-CA" dirty="0"/>
+              <a:t> of hard links are that </a:t>
+            </a:r>
+            <a:r>
+              <a:rPr lang="en-CA" b="1" dirty="0"/>
+              <a:t>they take-up extra space</a:t>
+            </a:r>
+            <a:r>
+              <a:rPr lang="en-CA" dirty="0"/>
+              <a:t>, </a:t>
+            </a:r>
+            <a:br>
+              <a:rPr lang="en-CA" dirty="0"/>
+            </a:br>
+            <a:r>
+              <a:rPr lang="en-CA" dirty="0"/>
+              <a:t>you </a:t>
+            </a:r>
+            <a:r>
+              <a:rPr lang="en-CA" b="1" dirty="0"/>
+              <a:t>cannot hard link directories</a:t>
+            </a:r>
+            <a:r>
+              <a:rPr lang="en-CA" dirty="0"/>
+              <a:t>.  Also, you </a:t>
+            </a:r>
+            <a:r>
+              <a:rPr lang="en-CA" b="1" dirty="0"/>
+              <a:t>cannot hard link files from other Unix/Linux servers</a:t>
+            </a:r>
+            <a:r>
+              <a:rPr lang="en-CA" dirty="0"/>
+              <a:t> (since the </a:t>
+            </a:r>
+            <a:r>
+              <a:rPr lang="en-CA" dirty="0" err="1"/>
+              <a:t>i</a:t>
+            </a:r>
+            <a:r>
+              <a:rPr lang="en-CA" dirty="0"/>
+              <a:t>-node number </a:t>
+            </a:r>
+            <a:br>
+              <a:rPr lang="en-CA" dirty="0"/>
+            </a:br>
+            <a:r>
+              <a:rPr lang="en-CA" dirty="0"/>
+              <a:t>may already be used by the other Unix/Linux server).</a:t>
+            </a:r>
+          </a:p>
+        </p:txBody>
+      </p:sp>
+      <p:pic>
+        <p:nvPicPr>
+          <p:cNvPr id="8" name="Picture 7" descr="Diagram&#10;&#10;Description automatically generated">
+            <a:extLst>
+              <a:ext uri="{FF2B5EF4-FFF2-40B4-BE49-F238E27FC236}">
+                <a16:creationId xmlns:a16="http://schemas.microsoft.com/office/drawing/2014/main" id="{9A513A24-2D1F-3246-9771-D9B5386DA931}"/>
+              </a:ext>
+            </a:extLst>
+          </p:cNvPr>
+          <p:cNvPicPr>
+            <a:picLocks noChangeAspect="1"/>
+          </p:cNvPicPr>
+          <p:nvPr/>
+        </p:nvPicPr>
+        <p:blipFill>
+          <a:blip r:embed="rId2"/>
+          <a:stretch>
+            <a:fillRect/>
+          </a:stretch>
+        </p:blipFill>
+        <p:spPr>
+          <a:xfrm>
+            <a:off x="7840133" y="2330450"/>
+            <a:ext cx="4064000" cy="2197100"/>
+          </a:xfrm>
+          <a:prstGeom prst="rect">
+            <a:avLst/>
+          </a:prstGeom>
+          <a:ln>
+            <a:solidFill>
+              <a:srgbClr val="0070C0"/>
+            </a:solidFill>
+          </a:ln>
+        </p:spPr>
+      </p:pic>
+    </p:spTree>
+    <p:extLst>
+      <p:ext uri="{BB962C8B-B14F-4D97-AF65-F5344CB8AC3E}">
+        <p14:creationId xmlns:p14="http://schemas.microsoft.com/office/powerpoint/2010/main" val="1486106247"/>
       </p:ext>
     </p:extLst>
   </p:cSld>
@@ -5591,507 +6281,6 @@
                                   </p:childTnLst>
                                 </p:cTn>
                               </p:par>
-                              <p:par>
-                                <p:cTn id="17" presetID="1" presetClass="entr" presetSubtype="0" fill="hold" nodeType="withEffect">
-                                  <p:stCondLst>
-                                    <p:cond delay="0"/>
-                                  </p:stCondLst>
-                                  <p:childTnLst>
-                                    <p:set>
-                                      <p:cBhvr>
-                                        <p:cTn id="18" dur="1" fill="hold">
-                                          <p:stCondLst>
-                                            <p:cond delay="0"/>
-                                          </p:stCondLst>
-                                        </p:cTn>
-                                        <p:tgtEl>
-                                          <p:spTgt spid="5"/>
-                                        </p:tgtEl>
-                                        <p:attrNameLst>
-                                          <p:attrName>style.visibility</p:attrName>
-                                        </p:attrNameLst>
-                                      </p:cBhvr>
-                                      <p:to>
-                                        <p:strVal val="visible"/>
-                                      </p:to>
-                                    </p:set>
-                                  </p:childTnLst>
-                                </p:cTn>
-                              </p:par>
-                            </p:childTnLst>
-                          </p:cTn>
-                        </p:par>
-                      </p:childTnLst>
-                    </p:cTn>
-                  </p:par>
-                </p:childTnLst>
-              </p:cTn>
-              <p:prevCondLst>
-                <p:cond evt="onPrev" delay="0">
-                  <p:tgtEl>
-                    <p:sldTgt/>
-                  </p:tgtEl>
-                </p:cond>
-              </p:prevCondLst>
-              <p:nextCondLst>
-                <p:cond evt="onNext" delay="0">
-                  <p:tgtEl>
-                    <p:sldTgt/>
-                  </p:tgtEl>
-                </p:cond>
-              </p:nextCondLst>
-            </p:seq>
-          </p:childTnLst>
-        </p:cTn>
-      </p:par>
-    </p:tnLst>
-    <p:bldLst>
-      <p:bldP spid="3" grpId="0" uiExpand="1" build="p"/>
-    </p:bldLst>
-  </p:timing>
-</p:sld>
-</file>
-
-<file path=ppt/slides/slide4.xml><?xml version="1.0" encoding="utf-8"?>
-<p:sld xmlns:a="http://schemas.openxmlformats.org/drawingml/2006/main" xmlns:r="http://schemas.openxmlformats.org/officeDocument/2006/relationships" xmlns:p="http://schemas.openxmlformats.org/presentationml/2006/main" showMasterSp="0">
-  <p:cSld>
-    <p:spTree>
-      <p:nvGrpSpPr>
-        <p:cNvPr id="1" name=""/>
-        <p:cNvGrpSpPr/>
-        <p:nvPr/>
-      </p:nvGrpSpPr>
-      <p:grpSpPr>
-        <a:xfrm>
-          <a:off x="0" y="0"/>
-          <a:ext cx="0" cy="0"/>
-          <a:chOff x="0" y="0"/>
-          <a:chExt cx="0" cy="0"/>
-        </a:xfrm>
-      </p:grpSpPr>
-      <p:sp>
-        <p:nvSpPr>
-          <p:cNvPr id="2" name="Title 1">
-            <a:extLst>
-              <a:ext uri="{FF2B5EF4-FFF2-40B4-BE49-F238E27FC236}">
-                <a16:creationId xmlns:a16="http://schemas.microsoft.com/office/drawing/2014/main" id="{303829AC-DEC4-1147-BF51-3849E59AC39E}"/>
-              </a:ext>
-            </a:extLst>
-          </p:cNvPr>
-          <p:cNvSpPr>
-            <a:spLocks noGrp="1"/>
-          </p:cNvSpPr>
-          <p:nvPr>
-            <p:ph type="title"/>
-          </p:nvPr>
-        </p:nvSpPr>
-        <p:spPr/>
-        <p:txBody>
-          <a:bodyPr>
-            <a:normAutofit/>
-          </a:bodyPr>
-          <a:lstStyle/>
-          <a:p>
-            <a:r>
-              <a:rPr lang="en-US" sz="2800" dirty="0"/>
-              <a:t>Linking files</a:t>
-            </a:r>
-            <a:endParaRPr lang="en-US" sz="3000" dirty="0"/>
-          </a:p>
-        </p:txBody>
-      </p:sp>
-      <p:sp>
-        <p:nvSpPr>
-          <p:cNvPr id="3" name="Content Placeholder 2">
-            <a:extLst>
-              <a:ext uri="{FF2B5EF4-FFF2-40B4-BE49-F238E27FC236}">
-                <a16:creationId xmlns:a16="http://schemas.microsoft.com/office/drawing/2014/main" id="{99DF4C7A-3854-7B4B-8D4F-4AD959A565DC}"/>
-              </a:ext>
-            </a:extLst>
-          </p:cNvPr>
-          <p:cNvSpPr>
-            <a:spLocks noGrp="1"/>
-          </p:cNvSpPr>
-          <p:nvPr>
-            <p:ph idx="1"/>
-          </p:nvPr>
-        </p:nvSpPr>
-        <p:spPr>
-          <a:xfrm>
-            <a:off x="1451579" y="1706813"/>
-            <a:ext cx="6153187" cy="4755771"/>
-          </a:xfrm>
-        </p:spPr>
-        <p:txBody>
-          <a:bodyPr>
-            <a:normAutofit fontScale="85000" lnSpcReduction="10000"/>
-          </a:bodyPr>
-          <a:lstStyle/>
-          <a:p>
-            <a:pPr marL="0" indent="0">
-              <a:buNone/>
-            </a:pPr>
-            <a:r>
-              <a:rPr lang="en-CA" sz="2800" b="1" dirty="0"/>
-              <a:t>Hard Links</a:t>
-            </a:r>
-            <a:r>
-              <a:rPr lang="en-CA" b="1" dirty="0"/>
-              <a:t/>
-            </a:r>
-            <a:br>
-              <a:rPr lang="en-CA" b="1" dirty="0"/>
-            </a:br>
-            <a:r>
-              <a:rPr lang="en-CA" b="1" dirty="0"/>
-              <a:t/>
-            </a:r>
-            <a:br>
-              <a:rPr lang="en-CA" b="1" dirty="0"/>
-            </a:br>
-            <a:r>
-              <a:rPr lang="en-CA" dirty="0"/>
-              <a:t>A </a:t>
-            </a:r>
-            <a:r>
-              <a:rPr lang="en-CA" b="1" dirty="0"/>
-              <a:t>Hard link</a:t>
-            </a:r>
-            <a:r>
-              <a:rPr lang="en-CA" dirty="0"/>
-              <a:t> is a </a:t>
-            </a:r>
-            <a:r>
-              <a:rPr lang="en-CA" b="1" dirty="0"/>
-              <a:t>reference</a:t>
-            </a:r>
-            <a:r>
-              <a:rPr lang="en-CA" dirty="0"/>
-              <a:t> to the </a:t>
-            </a:r>
-            <a:r>
-              <a:rPr lang="en-CA" b="1" dirty="0"/>
-              <a:t>same index </a:t>
-            </a:r>
-            <a:r>
-              <a:rPr lang="en-CA" dirty="0"/>
-              <a:t>on a file system. </a:t>
-            </a:r>
-            <a:br>
-              <a:rPr lang="en-CA" dirty="0"/>
-            </a:br>
-            <a:r>
-              <a:rPr lang="en-CA" dirty="0"/>
-              <a:t>It does this by creating a file that </a:t>
-            </a:r>
-            <a:r>
-              <a:rPr lang="en-CA" b="1" dirty="0"/>
-              <a:t>shares the same </a:t>
-            </a:r>
-            <a:r>
-              <a:rPr lang="en-CA" b="1" dirty="0" err="1"/>
-              <a:t>i</a:t>
-            </a:r>
-            <a:r>
-              <a:rPr lang="en-CA" b="1" dirty="0"/>
-              <a:t>-node number </a:t>
-            </a:r>
-            <a:r>
-              <a:rPr lang="en-CA" dirty="0"/>
-              <a:t>with the other file.</a:t>
-            </a:r>
-          </a:p>
-          <a:p>
-            <a:pPr marL="0" indent="0">
-              <a:buNone/>
-            </a:pPr>
-            <a:r>
-              <a:rPr lang="en-CA" dirty="0"/>
-              <a:t>An </a:t>
-            </a:r>
-            <a:r>
-              <a:rPr lang="en-CA" b="1" dirty="0"/>
-              <a:t>advantage </a:t>
-            </a:r>
-            <a:r>
-              <a:rPr lang="en-CA" dirty="0"/>
-              <a:t>of using hard links is that if one hard link remains (even if original file has been removed), </a:t>
-            </a:r>
-            <a:r>
-              <a:rPr lang="en-CA" b="1" dirty="0"/>
-              <a:t>the data in that hard-linked file is NOT lost</a:t>
-            </a:r>
-            <a:r>
-              <a:rPr lang="en-CA" dirty="0"/>
-              <a:t>.  Also, any change to each file will be reflected in any hard-linked file which is useful for </a:t>
-            </a:r>
-            <a:r>
-              <a:rPr lang="en-CA" b="1" dirty="0"/>
-              <a:t>backups</a:t>
-            </a:r>
-            <a:r>
-              <a:rPr lang="en-CA" dirty="0"/>
-              <a:t>.</a:t>
-            </a:r>
-          </a:p>
-          <a:p>
-            <a:pPr marL="0" indent="0">
-              <a:buNone/>
-            </a:pPr>
-            <a:r>
-              <a:rPr lang="en-CA" b="1" dirty="0"/>
-              <a:t>Limitations</a:t>
-            </a:r>
-            <a:r>
-              <a:rPr lang="en-CA" dirty="0"/>
-              <a:t> of hard links are that </a:t>
-            </a:r>
-            <a:r>
-              <a:rPr lang="en-CA" b="1" dirty="0"/>
-              <a:t>they take-up extra space</a:t>
-            </a:r>
-            <a:r>
-              <a:rPr lang="en-CA" dirty="0"/>
-              <a:t>, </a:t>
-            </a:r>
-            <a:br>
-              <a:rPr lang="en-CA" dirty="0"/>
-            </a:br>
-            <a:r>
-              <a:rPr lang="en-CA" dirty="0"/>
-              <a:t>you </a:t>
-            </a:r>
-            <a:r>
-              <a:rPr lang="en-CA" b="1" dirty="0"/>
-              <a:t>cannot hard link directories</a:t>
-            </a:r>
-            <a:r>
-              <a:rPr lang="en-CA" dirty="0"/>
-              <a:t>.  Also, you </a:t>
-            </a:r>
-            <a:r>
-              <a:rPr lang="en-CA" b="1" dirty="0"/>
-              <a:t>cannot hard link files from other Unix/Linux servers</a:t>
-            </a:r>
-            <a:r>
-              <a:rPr lang="en-CA" dirty="0"/>
-              <a:t> (since the </a:t>
-            </a:r>
-            <a:r>
-              <a:rPr lang="en-CA" dirty="0" err="1"/>
-              <a:t>i</a:t>
-            </a:r>
-            <a:r>
-              <a:rPr lang="en-CA" dirty="0"/>
-              <a:t>-node number </a:t>
-            </a:r>
-            <a:br>
-              <a:rPr lang="en-CA" dirty="0"/>
-            </a:br>
-            <a:r>
-              <a:rPr lang="en-CA" dirty="0"/>
-              <a:t>may already be used by the other Unix/Linux server).</a:t>
-            </a:r>
-          </a:p>
-        </p:txBody>
-      </p:sp>
-      <p:pic>
-        <p:nvPicPr>
-          <p:cNvPr id="8" name="Picture 7" descr="Diagram&#10;&#10;Description automatically generated">
-            <a:extLst>
-              <a:ext uri="{FF2B5EF4-FFF2-40B4-BE49-F238E27FC236}">
-                <a16:creationId xmlns:a16="http://schemas.microsoft.com/office/drawing/2014/main" id="{9A513A24-2D1F-3246-9771-D9B5386DA931}"/>
-              </a:ext>
-            </a:extLst>
-          </p:cNvPr>
-          <p:cNvPicPr>
-            <a:picLocks noChangeAspect="1"/>
-          </p:cNvPicPr>
-          <p:nvPr/>
-        </p:nvPicPr>
-        <p:blipFill>
-          <a:blip r:embed="rId2"/>
-          <a:stretch>
-            <a:fillRect/>
-          </a:stretch>
-        </p:blipFill>
-        <p:spPr>
-          <a:xfrm>
-            <a:off x="7840133" y="2330450"/>
-            <a:ext cx="4064000" cy="2197100"/>
-          </a:xfrm>
-          <a:prstGeom prst="rect">
-            <a:avLst/>
-          </a:prstGeom>
-          <a:ln>
-            <a:solidFill>
-              <a:srgbClr val="0070C0"/>
-            </a:solidFill>
-          </a:ln>
-        </p:spPr>
-      </p:pic>
-    </p:spTree>
-    <p:extLst>
-      <p:ext uri="{BB962C8B-B14F-4D97-AF65-F5344CB8AC3E}">
-        <p14:creationId xmlns:p14="http://schemas.microsoft.com/office/powerpoint/2010/main" val="1486106247"/>
-      </p:ext>
-    </p:extLst>
-  </p:cSld>
-  <p:clrMapOvr>
-    <a:masterClrMapping/>
-  </p:clrMapOvr>
-  <p:timing>
-    <p:tnLst>
-      <p:par>
-        <p:cTn id="1" dur="indefinite" restart="never" nodeType="tmRoot">
-          <p:childTnLst>
-            <p:seq concurrent="1" nextAc="seek">
-              <p:cTn id="2" dur="indefinite" nodeType="mainSeq">
-                <p:childTnLst>
-                  <p:par>
-                    <p:cTn id="3" fill="hold">
-                      <p:stCondLst>
-                        <p:cond delay="indefinite"/>
-                        <p:cond evt="onBegin" delay="0">
-                          <p:tn val="2"/>
-                        </p:cond>
-                      </p:stCondLst>
-                      <p:childTnLst>
-                        <p:par>
-                          <p:cTn id="4" fill="hold">
-                            <p:stCondLst>
-                              <p:cond delay="0"/>
-                            </p:stCondLst>
-                            <p:childTnLst>
-                              <p:par>
-                                <p:cTn id="5" presetID="1" presetClass="entr" presetSubtype="0" fill="hold" grpId="0" nodeType="withEffect">
-                                  <p:stCondLst>
-                                    <p:cond delay="0"/>
-                                  </p:stCondLst>
-                                  <p:childTnLst>
-                                    <p:set>
-                                      <p:cBhvr>
-                                        <p:cTn id="6" dur="1" fill="hold">
-                                          <p:stCondLst>
-                                            <p:cond delay="0"/>
-                                          </p:stCondLst>
-                                        </p:cTn>
-                                        <p:tgtEl>
-                                          <p:spTgt spid="3">
-                                            <p:txEl>
-                                              <p:pRg st="0" end="0"/>
-                                            </p:txEl>
-                                          </p:spTgt>
-                                        </p:tgtEl>
-                                        <p:attrNameLst>
-                                          <p:attrName>style.visibility</p:attrName>
-                                        </p:attrNameLst>
-                                      </p:cBhvr>
-                                      <p:to>
-                                        <p:strVal val="visible"/>
-                                      </p:to>
-                                    </p:set>
-                                  </p:childTnLst>
-                                </p:cTn>
-                              </p:par>
-                            </p:childTnLst>
-                          </p:cTn>
-                        </p:par>
-                      </p:childTnLst>
-                    </p:cTn>
-                  </p:par>
-                  <p:par>
-                    <p:cTn id="7" fill="hold">
-                      <p:stCondLst>
-                        <p:cond delay="indefinite"/>
-                      </p:stCondLst>
-                      <p:childTnLst>
-                        <p:par>
-                          <p:cTn id="8" fill="hold">
-                            <p:stCondLst>
-                              <p:cond delay="0"/>
-                            </p:stCondLst>
-                            <p:childTnLst>
-                              <p:par>
-                                <p:cTn id="9" presetID="1" presetClass="entr" presetSubtype="0" fill="hold" grpId="0" nodeType="clickEffect">
-                                  <p:stCondLst>
-                                    <p:cond delay="0"/>
-                                  </p:stCondLst>
-                                  <p:childTnLst>
-                                    <p:set>
-                                      <p:cBhvr>
-                                        <p:cTn id="10" dur="1" fill="hold">
-                                          <p:stCondLst>
-                                            <p:cond delay="0"/>
-                                          </p:stCondLst>
-                                        </p:cTn>
-                                        <p:tgtEl>
-                                          <p:spTgt spid="3">
-                                            <p:txEl>
-                                              <p:pRg st="1" end="1"/>
-                                            </p:txEl>
-                                          </p:spTgt>
-                                        </p:tgtEl>
-                                        <p:attrNameLst>
-                                          <p:attrName>style.visibility</p:attrName>
-                                        </p:attrNameLst>
-                                      </p:cBhvr>
-                                      <p:to>
-                                        <p:strVal val="visible"/>
-                                      </p:to>
-                                    </p:set>
-                                  </p:childTnLst>
-                                </p:cTn>
-                              </p:par>
-                            </p:childTnLst>
-                          </p:cTn>
-                        </p:par>
-                      </p:childTnLst>
-                    </p:cTn>
-                  </p:par>
-                  <p:par>
-                    <p:cTn id="11" fill="hold">
-                      <p:stCondLst>
-                        <p:cond delay="indefinite"/>
-                      </p:stCondLst>
-                      <p:childTnLst>
-                        <p:par>
-                          <p:cTn id="12" fill="hold">
-                            <p:stCondLst>
-                              <p:cond delay="0"/>
-                            </p:stCondLst>
-                            <p:childTnLst>
-                              <p:par>
-                                <p:cTn id="13" presetID="1" presetClass="entr" presetSubtype="0" fill="hold" grpId="0" nodeType="clickEffect">
-                                  <p:stCondLst>
-                                    <p:cond delay="0"/>
-                                  </p:stCondLst>
-                                  <p:childTnLst>
-                                    <p:set>
-                                      <p:cBhvr>
-                                        <p:cTn id="14" dur="1" fill="hold">
-                                          <p:stCondLst>
-                                            <p:cond delay="0"/>
-                                          </p:stCondLst>
-                                        </p:cTn>
-                                        <p:tgtEl>
-                                          <p:spTgt spid="3">
-                                            <p:txEl>
-                                              <p:pRg st="2" end="2"/>
-                                            </p:txEl>
-                                          </p:spTgt>
-                                        </p:tgtEl>
-                                        <p:attrNameLst>
-                                          <p:attrName>style.visibility</p:attrName>
-                                        </p:attrNameLst>
-                                      </p:cBhvr>
-                                      <p:to>
-                                        <p:strVal val="visible"/>
-                                      </p:to>
-                                    </p:set>
-                                  </p:childTnLst>
-                                </p:cTn>
-                              </p:par>
                             </p:childTnLst>
                           </p:cTn>
                         </p:par>
@@ -6192,13 +6381,13 @@
         </p:nvSpPr>
         <p:spPr>
           <a:xfrm>
-            <a:off x="1451579" y="1706813"/>
+            <a:off x="1451579" y="1476543"/>
             <a:ext cx="6422421" cy="4755771"/>
           </a:xfrm>
         </p:spPr>
         <p:txBody>
           <a:bodyPr>
-            <a:normAutofit fontScale="92500" lnSpcReduction="20000"/>
+            <a:normAutofit fontScale="92500" lnSpcReduction="10000"/>
           </a:bodyPr>
           <a:lstStyle/>
           <a:p>
@@ -6209,20 +6398,11 @@
               <a:rPr lang="en-CA" sz="2400" b="1" dirty="0"/>
               <a:t>Hard Links</a:t>
             </a:r>
-            <a:r>
-              <a:rPr lang="en-CA" b="1" dirty="0"/>
-              <a:t/>
-            </a:r>
-            <a:br>
-              <a:rPr lang="en-CA" b="1" dirty="0"/>
-            </a:br>
-            <a:r>
-              <a:rPr lang="en-CA" b="1" dirty="0"/>
-              <a:t/>
-            </a:r>
-            <a:br>
-              <a:rPr lang="en-CA" b="1" dirty="0"/>
-            </a:br>
+          </a:p>
+          <a:p>
+            <a:pPr marL="0" indent="0">
+              <a:buNone/>
+            </a:pPr>
             <a:r>
               <a:rPr lang="en-CA" i="1" dirty="0"/>
               <a:t>Examples:</a:t>
@@ -6252,16 +6432,6 @@
                 <a:cs typeface="Courier New" panose="02070309020205020404" pitchFamily="49" charset="0"/>
               </a:rPr>
               <a:t>myfile.txt</a:t>
-            </a:r>
-            <a:r>
-              <a:rPr lang="en-CA" sz="1800" b="1" dirty="0">
-                <a:solidFill>
-                  <a:srgbClr val="0070C0"/>
-                </a:solidFill>
-                <a:latin typeface="Courier New" panose="02070309020205020404" pitchFamily="49" charset="0"/>
-                <a:cs typeface="Courier New" panose="02070309020205020404" pitchFamily="49" charset="0"/>
-              </a:rPr>
-              <a:t/>
             </a:r>
             <a:br>
               <a:rPr lang="en-CA" sz="1800" b="1" dirty="0">
@@ -6390,16 +6560,6 @@
               </a:rPr>
               <a:t>myfile.hard.lnk</a:t>
             </a:r>
-            <a:r>
-              <a:rPr lang="en-CA" sz="1800" b="1" dirty="0">
-                <a:solidFill>
-                  <a:srgbClr val="0070C0"/>
-                </a:solidFill>
-                <a:latin typeface="Courier New" panose="02070309020205020404" pitchFamily="49" charset="0"/>
-                <a:cs typeface="Courier New" panose="02070309020205020404" pitchFamily="49" charset="0"/>
-              </a:rPr>
-              <a:t/>
-            </a:r>
             <a:br>
               <a:rPr lang="en-CA" sz="1800" b="1" dirty="0">
                 <a:solidFill>
@@ -6439,104 +6599,48 @@
               </a:rPr>
               <a:t>*</a:t>
             </a:r>
-            <a:r>
-              <a:rPr lang="en-CA" sz="1800" b="1" dirty="0">
-                <a:latin typeface="Courier New" panose="02070309020205020404" pitchFamily="49" charset="0"/>
-                <a:cs typeface="Courier New" panose="02070309020205020404" pitchFamily="49" charset="0"/>
-              </a:rPr>
-              <a:t/>
-            </a:r>
             <a:br>
               <a:rPr lang="en-CA" sz="1800" b="1" dirty="0">
                 <a:latin typeface="Courier New" panose="02070309020205020404" pitchFamily="49" charset="0"/>
                 <a:cs typeface="Courier New" panose="02070309020205020404" pitchFamily="49" charset="0"/>
               </a:rPr>
             </a:br>
-            <a:r>
-              <a:rPr lang="en-CA" sz="1800" b="1" dirty="0">
-                <a:latin typeface="Courier New" panose="02070309020205020404" pitchFamily="49" charset="0"/>
-                <a:cs typeface="Courier New" panose="02070309020205020404" pitchFamily="49" charset="0"/>
-              </a:rPr>
-              <a:t/>
-            </a:r>
             <a:br>
               <a:rPr lang="en-CA" sz="1800" b="1" dirty="0">
                 <a:latin typeface="Courier New" panose="02070309020205020404" pitchFamily="49" charset="0"/>
                 <a:cs typeface="Courier New" panose="02070309020205020404" pitchFamily="49" charset="0"/>
               </a:rPr>
             </a:br>
-            <a:r>
-              <a:rPr lang="en-CA" sz="1800" b="1" dirty="0">
-                <a:latin typeface="Courier New" panose="02070309020205020404" pitchFamily="49" charset="0"/>
-                <a:cs typeface="Courier New" panose="02070309020205020404" pitchFamily="49" charset="0"/>
-              </a:rPr>
-              <a:t/>
-            </a:r>
             <a:br>
               <a:rPr lang="en-CA" sz="1800" b="1" dirty="0">
                 <a:latin typeface="Courier New" panose="02070309020205020404" pitchFamily="49" charset="0"/>
                 <a:cs typeface="Courier New" panose="02070309020205020404" pitchFamily="49" charset="0"/>
               </a:rPr>
             </a:br>
-            <a:r>
-              <a:rPr lang="en-CA" sz="1800" b="1" dirty="0">
-                <a:latin typeface="Courier New" panose="02070309020205020404" pitchFamily="49" charset="0"/>
-                <a:cs typeface="Courier New" panose="02070309020205020404" pitchFamily="49" charset="0"/>
-              </a:rPr>
-              <a:t/>
-            </a:r>
             <a:br>
               <a:rPr lang="en-CA" sz="1800" b="1" dirty="0">
                 <a:latin typeface="Courier New" panose="02070309020205020404" pitchFamily="49" charset="0"/>
                 <a:cs typeface="Courier New" panose="02070309020205020404" pitchFamily="49" charset="0"/>
               </a:rPr>
             </a:br>
-            <a:r>
-              <a:rPr lang="en-CA" sz="1800" b="1" dirty="0">
-                <a:latin typeface="Courier New" panose="02070309020205020404" pitchFamily="49" charset="0"/>
-                <a:cs typeface="Courier New" panose="02070309020205020404" pitchFamily="49" charset="0"/>
-              </a:rPr>
-              <a:t/>
-            </a:r>
             <a:br>
               <a:rPr lang="en-CA" sz="1800" b="1" dirty="0">
                 <a:latin typeface="Courier New" panose="02070309020205020404" pitchFamily="49" charset="0"/>
                 <a:cs typeface="Courier New" panose="02070309020205020404" pitchFamily="49" charset="0"/>
               </a:rPr>
             </a:br>
-            <a:r>
-              <a:rPr lang="en-CA" sz="1800" b="1" dirty="0">
-                <a:latin typeface="Courier New" panose="02070309020205020404" pitchFamily="49" charset="0"/>
-                <a:cs typeface="Courier New" panose="02070309020205020404" pitchFamily="49" charset="0"/>
-              </a:rPr>
-              <a:t/>
-            </a:r>
             <a:br>
               <a:rPr lang="en-CA" sz="1800" b="1" dirty="0">
                 <a:latin typeface="Courier New" panose="02070309020205020404" pitchFamily="49" charset="0"/>
                 <a:cs typeface="Courier New" panose="02070309020205020404" pitchFamily="49" charset="0"/>
               </a:rPr>
             </a:br>
-            <a:r>
-              <a:rPr lang="en-CA" sz="1800" b="1" dirty="0">
-                <a:latin typeface="Courier New" panose="02070309020205020404" pitchFamily="49" charset="0"/>
-                <a:cs typeface="Courier New" panose="02070309020205020404" pitchFamily="49" charset="0"/>
-              </a:rPr>
-              <a:t/>
-            </a:r>
             <a:br>
               <a:rPr lang="en-CA" sz="1800" b="1" dirty="0">
                 <a:latin typeface="Courier New" panose="02070309020205020404" pitchFamily="49" charset="0"/>
                 <a:cs typeface="Courier New" panose="02070309020205020404" pitchFamily="49" charset="0"/>
               </a:rPr>
             </a:br>
-            <a:r>
-              <a:rPr lang="en-CA" sz="1800" b="1" dirty="0">
-                <a:latin typeface="Courier New" panose="02070309020205020404" pitchFamily="49" charset="0"/>
-                <a:cs typeface="Courier New" panose="02070309020205020404" pitchFamily="49" charset="0"/>
-              </a:rPr>
-              <a:t/>
-            </a:r>
             <a:br>
               <a:rPr lang="en-CA" sz="1800" b="1" dirty="0">
                 <a:latin typeface="Courier New" panose="02070309020205020404" pitchFamily="49" charset="0"/>
@@ -6578,7 +6682,7 @@
         </p:blipFill>
         <p:spPr>
           <a:xfrm>
-            <a:off x="1451579" y="4240369"/>
+            <a:off x="2690056" y="3935671"/>
             <a:ext cx="6811888" cy="2222215"/>
           </a:xfrm>
           <a:prstGeom prst="rect">
@@ -6686,6 +6790,37 @@
                                   </p:childTnLst>
                                 </p:cTn>
                               </p:par>
+                              <p:par>
+                                <p:cTn id="9" presetID="1" presetClass="entr" presetSubtype="0" fill="hold" grpId="0" nodeType="withEffect">
+                                  <p:stCondLst>
+                                    <p:cond delay="0"/>
+                                  </p:stCondLst>
+                                  <p:childTnLst>
+                                    <p:set>
+                                      <p:cBhvr>
+                                        <p:cTn id="10" dur="1" fill="hold">
+                                          <p:stCondLst>
+                                            <p:cond delay="0"/>
+                                          </p:stCondLst>
+                                        </p:cTn>
+                                        <p:tgtEl>
+                                          <p:spTgt spid="3">
+                                            <p:txEl>
+                                              <p:pRg st="2" end="2"/>
+                                            </p:txEl>
+                                          </p:spTgt>
+                                        </p:tgtEl>
+                                        <p:attrNameLst>
+                                          <p:attrName>style.visibility</p:attrName>
+                                        </p:attrNameLst>
+                                      </p:cBhvr>
+                                      <p:to>
+                                        <p:strVal val="visible"/>
+                                      </p:to>
+                                    </p:set>
+                                  </p:childTnLst>
+                                </p:cTn>
+                              </p:par>
                             </p:childTnLst>
                           </p:cTn>
                         </p:par>
@@ -6819,17 +6954,9 @@
               <a:rPr lang="en-CA" dirty="0"/>
               <a:t>.</a:t>
             </a:r>
-            <a:r>
-              <a:rPr lang="en-CA" sz="1200" dirty="0"/>
-              <a:t/>
-            </a:r>
             <a:br>
               <a:rPr lang="en-CA" sz="1200" dirty="0"/>
             </a:br>
-            <a:r>
-              <a:rPr lang="en-CA" sz="1200" dirty="0"/>
-              <a:t/>
-            </a:r>
             <a:br>
               <a:rPr lang="en-CA" sz="1200" dirty="0"/>
             </a:br>
@@ -6867,7 +6994,7 @@
           <a:blip r:embed="rId2">
             <a:extLst>
               <a:ext uri="{837473B0-CC2E-450A-ABE3-18F120FF3D39}">
-                <a1611:picAttrSrcUrl xmlns="" xmlns:a1611="http://schemas.microsoft.com/office/drawing/2016/11/main" r:id="rId3"/>
+                <a1611:picAttrSrcUrl xmlns:a1611="http://schemas.microsoft.com/office/drawing/2016/11/main" r:id="rId3"/>
               </a:ext>
             </a:extLst>
           </a:blip>
@@ -7080,13 +7207,13 @@
         </p:nvSpPr>
         <p:spPr>
           <a:xfrm>
-            <a:off x="1451577" y="1706813"/>
+            <a:off x="1451579" y="1329136"/>
             <a:ext cx="6778023" cy="4755771"/>
           </a:xfrm>
         </p:spPr>
         <p:txBody>
           <a:bodyPr>
-            <a:normAutofit fontScale="85000" lnSpcReduction="10000"/>
+            <a:normAutofit fontScale="92500" lnSpcReduction="10000"/>
           </a:bodyPr>
           <a:lstStyle/>
           <a:p>
@@ -7097,14 +7224,6 @@
               <a:rPr lang="en-CA" sz="3400" b="1" dirty="0"/>
               <a:t>Symbolic Links</a:t>
             </a:r>
-            <a:r>
-              <a:rPr lang="en-CA" b="1" dirty="0"/>
-              <a:t/>
-            </a:r>
-            <a:br>
-              <a:rPr lang="en-CA" b="1" dirty="0"/>
-            </a:br>
-            <a:endParaRPr lang="en-CA" b="1" dirty="0"/>
           </a:p>
           <a:p>
             <a:pPr marL="0" indent="0">
@@ -7243,17 +7362,6 @@
               <a:rPr lang="en-CA" dirty="0"/>
               <a:t>").</a:t>
             </a:r>
-            <a:br>
-              <a:rPr lang="en-CA" dirty="0"/>
-            </a:br>
-            <a:r>
-              <a:rPr lang="en-CA" dirty="0"/>
-              <a:t/>
-            </a:r>
-            <a:br>
-              <a:rPr lang="en-CA" dirty="0"/>
-            </a:br>
-            <a:endParaRPr lang="en-CA" dirty="0"/>
           </a:p>
           <a:p>
             <a:pPr marL="0" indent="0">
@@ -7526,7 +7634,7 @@
 </file>
 
 <file path=ppt/slides/slide8.xml><?xml version="1.0" encoding="utf-8"?>
-<p:sld xmlns:a="http://schemas.openxmlformats.org/drawingml/2006/main" xmlns:r="http://schemas.openxmlformats.org/officeDocument/2006/relationships" xmlns:p="http://schemas.openxmlformats.org/presentationml/2006/main" showMasterSp="0">
+<p:sld xmlns:a="http://schemas.openxmlformats.org/drawingml/2006/main" xmlns:r="http://schemas.openxmlformats.org/officeDocument/2006/relationships" xmlns:p="http://schemas.openxmlformats.org/presentationml/2006/main">
   <p:cSld>
     <p:spTree>
       <p:nvGrpSpPr>
@@ -7544,455 +7652,620 @@
       </p:grpSpPr>
       <p:sp>
         <p:nvSpPr>
-          <p:cNvPr id="2" name="Title 1">
-            <a:extLst>
-              <a:ext uri="{FF2B5EF4-FFF2-40B4-BE49-F238E27FC236}">
-                <a16:creationId xmlns:a16="http://schemas.microsoft.com/office/drawing/2014/main" id="{303829AC-DEC4-1147-BF51-3849E59AC39E}"/>
-              </a:ext>
-            </a:extLst>
-          </p:cNvPr>
-          <p:cNvSpPr>
-            <a:spLocks noGrp="1"/>
-          </p:cNvSpPr>
-          <p:nvPr>
-            <p:ph type="title"/>
-          </p:nvPr>
+          <p:cNvPr id="227" name="CustomShape 1"/>
+          <p:cNvSpPr/>
+          <p:nvPr/>
         </p:nvSpPr>
-        <p:spPr/>
+        <p:spPr>
+          <a:xfrm>
+            <a:off x="1451520" y="804600"/>
+            <a:ext cx="9601560" cy="1047600"/>
+          </a:xfrm>
+          <a:prstGeom prst="rect">
+            <a:avLst/>
+          </a:prstGeom>
+          <a:noFill/>
+          <a:ln>
+            <a:noFill/>
+          </a:ln>
+        </p:spPr>
+        <p:style>
+          <a:lnRef idx="0">
+            <a:scrgbClr r="0" g="0" b="0"/>
+          </a:lnRef>
+          <a:fillRef idx="0">
+            <a:scrgbClr r="0" g="0" b="0"/>
+          </a:fillRef>
+          <a:effectRef idx="0">
+            <a:scrgbClr r="0" g="0" b="0"/>
+          </a:effectRef>
+          <a:fontRef idx="minor"/>
+        </p:style>
         <p:txBody>
-          <a:bodyPr>
+          <a:bodyPr lIns="90000" tIns="45000" rIns="90000" bIns="45000">
             <a:normAutofit/>
           </a:bodyPr>
           <a:lstStyle/>
           <a:p>
-            <a:r>
-              <a:rPr lang="en-US" sz="2800" dirty="0"/>
+            <a:pPr>
+              <a:lnSpc>
+                <a:spcPct val="90000"/>
+              </a:lnSpc>
+            </a:pPr>
+            <a:r>
+              <a:rPr lang="en-US" sz="2800" b="0" strike="noStrike" cap="all" spc="-1">
+                <a:solidFill>
+                  <a:srgbClr val="000000"/>
+                </a:solidFill>
+                <a:latin typeface="Gill Sans MT"/>
+                <a:ea typeface="DejaVu Sans"/>
+              </a:rPr>
               <a:t>Linking files</a:t>
             </a:r>
-            <a:endParaRPr lang="en-US" sz="3000" dirty="0"/>
+            <a:endParaRPr lang="en-CA" sz="2800" b="0" strike="noStrike" spc="-1">
+              <a:latin typeface="Arial"/>
+            </a:endParaRPr>
           </a:p>
         </p:txBody>
       </p:sp>
       <p:sp>
         <p:nvSpPr>
-          <p:cNvPr id="3" name="Content Placeholder 2">
-            <a:extLst>
-              <a:ext uri="{FF2B5EF4-FFF2-40B4-BE49-F238E27FC236}">
-                <a16:creationId xmlns:a16="http://schemas.microsoft.com/office/drawing/2014/main" id="{99DF4C7A-3854-7B4B-8D4F-4AD959A565DC}"/>
-              </a:ext>
-            </a:extLst>
-          </p:cNvPr>
-          <p:cNvSpPr>
-            <a:spLocks noGrp="1"/>
-          </p:cNvSpPr>
-          <p:nvPr>
-            <p:ph idx="1"/>
-          </p:nvPr>
+          <p:cNvPr id="228" name="CustomShape 2"/>
+          <p:cNvSpPr/>
+          <p:nvPr/>
         </p:nvSpPr>
         <p:spPr>
           <a:xfrm>
-            <a:off x="1451577" y="1706813"/>
-            <a:ext cx="6879623" cy="4755771"/>
-          </a:xfrm>
-        </p:spPr>
-        <p:txBody>
-          <a:bodyPr>
-            <a:normAutofit fontScale="85000" lnSpcReduction="10000"/>
-          </a:bodyPr>
-          <a:lstStyle/>
-          <a:p>
-            <a:pPr marL="0" indent="0">
-              <a:buNone/>
-            </a:pPr>
-            <a:r>
-              <a:rPr lang="en-CA" sz="3400" b="1" dirty="0"/>
-              <a:t>Symbolic Links</a:t>
-            </a:r>
-            <a:r>
-              <a:rPr lang="en-CA" b="1" dirty="0"/>
-              <a:t/>
-            </a:r>
-            <a:br>
-              <a:rPr lang="en-CA" b="1" dirty="0"/>
-            </a:br>
-            <a:endParaRPr lang="en-CA" b="1" dirty="0"/>
-          </a:p>
-          <a:p>
-            <a:pPr marL="0" indent="0">
-              <a:buNone/>
-            </a:pPr>
-            <a:r>
-              <a:rPr lang="en-CA" i="1" dirty="0"/>
-              <a:t>Examples:</a:t>
-            </a:r>
-            <a:endParaRPr lang="en-CA" dirty="0"/>
-          </a:p>
-          <a:p>
-            <a:pPr marL="0" indent="0">
-              <a:buNone/>
-            </a:pPr>
-            <a:r>
-              <a:rPr lang="en-CA" sz="1800" b="1" dirty="0">
-                <a:solidFill>
-                  <a:srgbClr val="0070C0"/>
-                </a:solidFill>
-                <a:latin typeface="Courier New" panose="02070309020205020404" pitchFamily="49" charset="0"/>
-                <a:cs typeface="Courier New" panose="02070309020205020404" pitchFamily="49" charset="0"/>
-              </a:rPr>
-              <a:t>touch </a:t>
-            </a:r>
-            <a:r>
-              <a:rPr lang="en-CA" sz="1800" b="1" dirty="0" err="1">
-                <a:solidFill>
-                  <a:srgbClr val="0070C0"/>
-                </a:solidFill>
-                <a:latin typeface="Courier New" panose="02070309020205020404" pitchFamily="49" charset="0"/>
-                <a:cs typeface="Courier New" panose="02070309020205020404" pitchFamily="49" charset="0"/>
-              </a:rPr>
-              <a:t>otherfile.txt</a:t>
-            </a:r>
-            <a:r>
-              <a:rPr lang="en-CA" sz="1800" b="1" dirty="0">
-                <a:solidFill>
-                  <a:srgbClr val="0070C0"/>
-                </a:solidFill>
-                <a:latin typeface="Courier New" panose="02070309020205020404" pitchFamily="49" charset="0"/>
-                <a:cs typeface="Courier New" panose="02070309020205020404" pitchFamily="49" charset="0"/>
-              </a:rPr>
-              <a:t/>
-            </a:r>
-            <a:br>
-              <a:rPr lang="en-CA" sz="1800" b="1" dirty="0">
-                <a:solidFill>
-                  <a:srgbClr val="0070C0"/>
-                </a:solidFill>
-                <a:latin typeface="Courier New" panose="02070309020205020404" pitchFamily="49" charset="0"/>
-                <a:cs typeface="Courier New" panose="02070309020205020404" pitchFamily="49" charset="0"/>
-              </a:rPr>
-            </a:br>
-            <a:r>
-              <a:rPr lang="en-CA" sz="1800" b="1" dirty="0">
-                <a:solidFill>
-                  <a:srgbClr val="0070C0"/>
-                </a:solidFill>
-                <a:latin typeface="Courier New" panose="02070309020205020404" pitchFamily="49" charset="0"/>
-                <a:cs typeface="Courier New" panose="02070309020205020404" pitchFamily="49" charset="0"/>
-              </a:rPr>
-              <a:t>ln -s </a:t>
-            </a:r>
-            <a:r>
-              <a:rPr lang="en-CA" sz="1800" b="1" dirty="0" err="1">
-                <a:solidFill>
-                  <a:srgbClr val="0070C0"/>
-                </a:solidFill>
-                <a:latin typeface="Courier New" panose="02070309020205020404" pitchFamily="49" charset="0"/>
-                <a:cs typeface="Courier New" panose="02070309020205020404" pitchFamily="49" charset="0"/>
-              </a:rPr>
-              <a:t>otherfile.txt</a:t>
-            </a:r>
-            <a:r>
-              <a:rPr lang="en-CA" sz="1800" b="1" dirty="0">
-                <a:solidFill>
-                  <a:srgbClr val="0070C0"/>
-                </a:solidFill>
-                <a:latin typeface="Courier New" panose="02070309020205020404" pitchFamily="49" charset="0"/>
-                <a:cs typeface="Courier New" panose="02070309020205020404" pitchFamily="49" charset="0"/>
-              </a:rPr>
-              <a:t> otherfile1.sym.lnk</a:t>
-            </a:r>
-            <a:br>
-              <a:rPr lang="en-CA" sz="1800" b="1" dirty="0">
-                <a:solidFill>
-                  <a:srgbClr val="0070C0"/>
-                </a:solidFill>
-                <a:latin typeface="Courier New" panose="02070309020205020404" pitchFamily="49" charset="0"/>
-                <a:cs typeface="Courier New" panose="02070309020205020404" pitchFamily="49" charset="0"/>
-              </a:rPr>
-            </a:br>
-            <a:r>
-              <a:rPr lang="en-CA" sz="1800" b="1" dirty="0">
-                <a:solidFill>
-                  <a:srgbClr val="0070C0"/>
-                </a:solidFill>
-                <a:latin typeface="Courier New" panose="02070309020205020404" pitchFamily="49" charset="0"/>
-                <a:cs typeface="Courier New" panose="02070309020205020404" pitchFamily="49" charset="0"/>
-              </a:rPr>
-              <a:t>ln -s </a:t>
-            </a:r>
-            <a:r>
-              <a:rPr lang="en-CA" sz="1800" b="1" dirty="0" err="1">
-                <a:solidFill>
-                  <a:srgbClr val="0070C0"/>
-                </a:solidFill>
-                <a:latin typeface="Courier New" panose="02070309020205020404" pitchFamily="49" charset="0"/>
-                <a:cs typeface="Courier New" panose="02070309020205020404" pitchFamily="49" charset="0"/>
-              </a:rPr>
-              <a:t>otherfile.txt</a:t>
-            </a:r>
-            <a:r>
-              <a:rPr lang="en-CA" sz="1800" b="1" dirty="0">
-                <a:solidFill>
-                  <a:srgbClr val="0070C0"/>
-                </a:solidFill>
-                <a:latin typeface="Courier New" panose="02070309020205020404" pitchFamily="49" charset="0"/>
-                <a:cs typeface="Courier New" panose="02070309020205020404" pitchFamily="49" charset="0"/>
-              </a:rPr>
-              <a:t> otherfile2.sym.lnk</a:t>
-            </a:r>
-            <a:br>
-              <a:rPr lang="en-CA" sz="1800" b="1" dirty="0">
-                <a:solidFill>
-                  <a:srgbClr val="0070C0"/>
-                </a:solidFill>
-                <a:latin typeface="Courier New" panose="02070309020205020404" pitchFamily="49" charset="0"/>
-                <a:cs typeface="Courier New" panose="02070309020205020404" pitchFamily="49" charset="0"/>
-              </a:rPr>
-            </a:br>
-            <a:r>
-              <a:rPr lang="en-CA" sz="1800" b="1" dirty="0">
-                <a:solidFill>
-                  <a:srgbClr val="0070C0"/>
-                </a:solidFill>
-                <a:latin typeface="Courier New" panose="02070309020205020404" pitchFamily="49" charset="0"/>
-                <a:cs typeface="Courier New" panose="02070309020205020404" pitchFamily="49" charset="0"/>
-              </a:rPr>
-              <a:t>ln -s </a:t>
-            </a:r>
-            <a:r>
-              <a:rPr lang="en-CA" sz="1800" b="1" dirty="0" err="1">
-                <a:solidFill>
-                  <a:srgbClr val="0070C0"/>
-                </a:solidFill>
-                <a:latin typeface="Courier New" panose="02070309020205020404" pitchFamily="49" charset="0"/>
-                <a:cs typeface="Courier New" panose="02070309020205020404" pitchFamily="49" charset="0"/>
-              </a:rPr>
-              <a:t>otherfile.txt</a:t>
-            </a:r>
-            <a:r>
-              <a:rPr lang="en-CA" sz="1800" b="1" dirty="0">
-                <a:solidFill>
-                  <a:srgbClr val="0070C0"/>
-                </a:solidFill>
-                <a:latin typeface="Courier New" panose="02070309020205020404" pitchFamily="49" charset="0"/>
-                <a:cs typeface="Courier New" panose="02070309020205020404" pitchFamily="49" charset="0"/>
-              </a:rPr>
-              <a:t> ~/backups/</a:t>
-            </a:r>
-            <a:r>
-              <a:rPr lang="en-CA" sz="1800" b="1" dirty="0" err="1">
-                <a:solidFill>
-                  <a:srgbClr val="0070C0"/>
-                </a:solidFill>
-                <a:latin typeface="Courier New" panose="02070309020205020404" pitchFamily="49" charset="0"/>
-                <a:cs typeface="Courier New" panose="02070309020205020404" pitchFamily="49" charset="0"/>
-              </a:rPr>
-              <a:t>otherfile.sym.lnk</a:t>
-            </a:r>
-            <a:r>
-              <a:rPr lang="en-CA" sz="1800" b="1" dirty="0">
-                <a:solidFill>
-                  <a:srgbClr val="0070C0"/>
-                </a:solidFill>
-                <a:latin typeface="Courier New" panose="02070309020205020404" pitchFamily="49" charset="0"/>
-                <a:cs typeface="Courier New" panose="02070309020205020404" pitchFamily="49" charset="0"/>
-              </a:rPr>
-              <a:t/>
-            </a:r>
-            <a:br>
-              <a:rPr lang="en-CA" sz="1800" b="1" dirty="0">
-                <a:solidFill>
-                  <a:srgbClr val="0070C0"/>
-                </a:solidFill>
-                <a:latin typeface="Courier New" panose="02070309020205020404" pitchFamily="49" charset="0"/>
-                <a:cs typeface="Courier New" panose="02070309020205020404" pitchFamily="49" charset="0"/>
-              </a:rPr>
-            </a:br>
-            <a:r>
-              <a:rPr lang="en-CA" sz="1800" b="1" dirty="0">
-                <a:solidFill>
-                  <a:srgbClr val="0070C0"/>
-                </a:solidFill>
-                <a:latin typeface="Courier New" panose="02070309020205020404" pitchFamily="49" charset="0"/>
-                <a:cs typeface="Courier New" panose="02070309020205020404" pitchFamily="49" charset="0"/>
-              </a:rPr>
-              <a:t>ls –li </a:t>
-            </a:r>
-            <a:r>
-              <a:rPr lang="en-CA" sz="1800" b="1" dirty="0" err="1">
-                <a:solidFill>
-                  <a:srgbClr val="0070C0"/>
-                </a:solidFill>
-                <a:latin typeface="Courier New" panose="02070309020205020404" pitchFamily="49" charset="0"/>
-                <a:cs typeface="Courier New" panose="02070309020205020404" pitchFamily="49" charset="0"/>
-              </a:rPr>
-              <a:t>otherfile</a:t>
-            </a:r>
-            <a:r>
-              <a:rPr lang="en-CA" sz="1800" b="1" dirty="0">
-                <a:solidFill>
-                  <a:srgbClr val="0070C0"/>
-                </a:solidFill>
-                <a:latin typeface="Courier New" panose="02070309020205020404" pitchFamily="49" charset="0"/>
-                <a:cs typeface="Courier New" panose="02070309020205020404" pitchFamily="49" charset="0"/>
-              </a:rPr>
-              <a:t>*</a:t>
-            </a:r>
-            <a:r>
-              <a:rPr lang="en-CA" sz="1800" b="1" dirty="0">
-                <a:latin typeface="Courier New" panose="02070309020205020404" pitchFamily="49" charset="0"/>
-                <a:cs typeface="Courier New" panose="02070309020205020404" pitchFamily="49" charset="0"/>
-              </a:rPr>
-              <a:t/>
-            </a:r>
-            <a:br>
-              <a:rPr lang="en-CA" sz="1800" b="1" dirty="0">
-                <a:latin typeface="Courier New" panose="02070309020205020404" pitchFamily="49" charset="0"/>
-                <a:cs typeface="Courier New" panose="02070309020205020404" pitchFamily="49" charset="0"/>
-              </a:rPr>
-            </a:br>
-            <a:r>
-              <a:rPr lang="en-CA" sz="1800" b="1" dirty="0">
-                <a:latin typeface="Courier New" panose="02070309020205020404" pitchFamily="49" charset="0"/>
-                <a:cs typeface="Courier New" panose="02070309020205020404" pitchFamily="49" charset="0"/>
-              </a:rPr>
-              <a:t/>
-            </a:r>
-            <a:br>
-              <a:rPr lang="en-CA" sz="1800" b="1" dirty="0">
-                <a:latin typeface="Courier New" panose="02070309020205020404" pitchFamily="49" charset="0"/>
-                <a:cs typeface="Courier New" panose="02070309020205020404" pitchFamily="49" charset="0"/>
-              </a:rPr>
-            </a:br>
-            <a:r>
-              <a:rPr lang="en-CA" sz="1800" b="1" dirty="0">
-                <a:latin typeface="Courier New" panose="02070309020205020404" pitchFamily="49" charset="0"/>
-                <a:cs typeface="Courier New" panose="02070309020205020404" pitchFamily="49" charset="0"/>
-              </a:rPr>
-              <a:t/>
-            </a:r>
-            <a:br>
-              <a:rPr lang="en-CA" sz="1800" b="1" dirty="0">
-                <a:latin typeface="Courier New" panose="02070309020205020404" pitchFamily="49" charset="0"/>
-                <a:cs typeface="Courier New" panose="02070309020205020404" pitchFamily="49" charset="0"/>
-              </a:rPr>
-            </a:br>
-            <a:r>
-              <a:rPr lang="en-CA" sz="1800" b="1" dirty="0">
-                <a:latin typeface="Courier New" panose="02070309020205020404" pitchFamily="49" charset="0"/>
-                <a:cs typeface="Courier New" panose="02070309020205020404" pitchFamily="49" charset="0"/>
-              </a:rPr>
-              <a:t/>
-            </a:r>
-            <a:br>
-              <a:rPr lang="en-CA" sz="1800" b="1" dirty="0">
-                <a:latin typeface="Courier New" panose="02070309020205020404" pitchFamily="49" charset="0"/>
-                <a:cs typeface="Courier New" panose="02070309020205020404" pitchFamily="49" charset="0"/>
-              </a:rPr>
-            </a:br>
-            <a:r>
-              <a:rPr lang="en-CA" sz="1800" b="1" dirty="0">
-                <a:latin typeface="Courier New" panose="02070309020205020404" pitchFamily="49" charset="0"/>
-                <a:cs typeface="Courier New" panose="02070309020205020404" pitchFamily="49" charset="0"/>
-              </a:rPr>
-              <a:t/>
-            </a:r>
-            <a:br>
-              <a:rPr lang="en-CA" sz="1800" b="1" dirty="0">
-                <a:latin typeface="Courier New" panose="02070309020205020404" pitchFamily="49" charset="0"/>
-                <a:cs typeface="Courier New" panose="02070309020205020404" pitchFamily="49" charset="0"/>
-              </a:rPr>
-            </a:br>
-            <a:r>
-              <a:rPr lang="en-CA" sz="1800" b="1" dirty="0">
-                <a:latin typeface="Courier New" panose="02070309020205020404" pitchFamily="49" charset="0"/>
-                <a:cs typeface="Courier New" panose="02070309020205020404" pitchFamily="49" charset="0"/>
-              </a:rPr>
-              <a:t/>
-            </a:r>
-            <a:br>
-              <a:rPr lang="en-CA" sz="1800" b="1" dirty="0">
-                <a:latin typeface="Courier New" panose="02070309020205020404" pitchFamily="49" charset="0"/>
-                <a:cs typeface="Courier New" panose="02070309020205020404" pitchFamily="49" charset="0"/>
-              </a:rPr>
-            </a:br>
-            <a:r>
-              <a:rPr lang="en-CA" sz="1800" b="1" dirty="0">
-                <a:latin typeface="Courier New" panose="02070309020205020404" pitchFamily="49" charset="0"/>
-                <a:cs typeface="Courier New" panose="02070309020205020404" pitchFamily="49" charset="0"/>
-              </a:rPr>
-              <a:t/>
-            </a:r>
-            <a:br>
-              <a:rPr lang="en-CA" sz="1800" b="1" dirty="0">
-                <a:latin typeface="Courier New" panose="02070309020205020404" pitchFamily="49" charset="0"/>
-                <a:cs typeface="Courier New" panose="02070309020205020404" pitchFamily="49" charset="0"/>
-              </a:rPr>
-            </a:br>
-            <a:r>
-              <a:rPr lang="en-CA" sz="1800" b="1" dirty="0">
-                <a:latin typeface="Courier New" panose="02070309020205020404" pitchFamily="49" charset="0"/>
-                <a:cs typeface="Courier New" panose="02070309020205020404" pitchFamily="49" charset="0"/>
-              </a:rPr>
-              <a:t/>
-            </a:r>
-            <a:br>
-              <a:rPr lang="en-CA" sz="1800" b="1" dirty="0">
-                <a:latin typeface="Courier New" panose="02070309020205020404" pitchFamily="49" charset="0"/>
-                <a:cs typeface="Courier New" panose="02070309020205020404" pitchFamily="49" charset="0"/>
-              </a:rPr>
-            </a:br>
-            <a:endParaRPr lang="en-CA" sz="1800" dirty="0">
-              <a:latin typeface="Courier New" panose="02070309020205020404" pitchFamily="49" charset="0"/>
-              <a:cs typeface="Courier New" panose="02070309020205020404" pitchFamily="49" charset="0"/>
-            </a:endParaRPr>
-          </a:p>
-          <a:p>
-            <a:pPr marL="0" indent="0">
-              <a:buNone/>
-            </a:pPr>
-            <a:endParaRPr lang="en-US" dirty="0"/>
-          </a:p>
-        </p:txBody>
-      </p:sp>
-      <p:pic>
-        <p:nvPicPr>
-          <p:cNvPr id="8" name="Picture 7" descr="A screenshot of a cell phone&#10;&#10;Description automatically generated">
-            <a:extLst>
-              <a:ext uri="{FF2B5EF4-FFF2-40B4-BE49-F238E27FC236}">
-                <a16:creationId xmlns:a16="http://schemas.microsoft.com/office/drawing/2014/main" id="{B6AC8B3C-7566-B247-8859-2C6805F2E5AD}"/>
-              </a:ext>
-            </a:extLst>
-          </p:cNvPr>
-          <p:cNvPicPr>
-            <a:picLocks noChangeAspect="1"/>
-          </p:cNvPicPr>
-          <p:nvPr/>
-        </p:nvPicPr>
-        <p:blipFill>
-          <a:blip r:embed="rId2"/>
-          <a:stretch>
-            <a:fillRect/>
-          </a:stretch>
-        </p:blipFill>
-        <p:spPr>
-          <a:xfrm>
-            <a:off x="1501299" y="4543970"/>
-            <a:ext cx="7507277" cy="1918614"/>
+            <a:off x="1451520" y="1360906"/>
+            <a:ext cx="6973389" cy="743478"/>
           </a:xfrm>
           <a:prstGeom prst="rect">
             <a:avLst/>
           </a:prstGeom>
+          <a:noFill/>
           <a:ln>
-            <a:solidFill>
-              <a:schemeClr val="tx1"/>
-            </a:solidFill>
+            <a:noFill/>
           </a:ln>
         </p:spPr>
-      </p:pic>
+        <p:style>
+          <a:lnRef idx="0">
+            <a:scrgbClr r="0" g="0" b="0"/>
+          </a:lnRef>
+          <a:fillRef idx="0">
+            <a:scrgbClr r="0" g="0" b="0"/>
+          </a:fillRef>
+          <a:effectRef idx="0">
+            <a:scrgbClr r="0" g="0" b="0"/>
+          </a:effectRef>
+          <a:fontRef idx="minor"/>
+        </p:style>
+        <p:txBody>
+          <a:bodyPr lIns="90000" tIns="45000" rIns="90000" bIns="45000">
+            <a:normAutofit fontScale="96000"/>
+          </a:bodyPr>
+          <a:lstStyle/>
+          <a:p>
+            <a:pPr>
+              <a:lnSpc>
+                <a:spcPct val="120000"/>
+              </a:lnSpc>
+              <a:spcBef>
+                <a:spcPts val="1001"/>
+              </a:spcBef>
+              <a:tabLst>
+                <a:tab pos="0" algn="l"/>
+              </a:tabLst>
+            </a:pPr>
+            <a:r>
+              <a:rPr lang="en-CA" sz="2800" b="1" strike="noStrike" spc="-1" dirty="0">
+                <a:solidFill>
+                  <a:srgbClr val="000000"/>
+                </a:solidFill>
+                <a:latin typeface="Gill Sans MT"/>
+                <a:ea typeface="DejaVu Sans"/>
+              </a:rPr>
+              <a:t>Hard Links vs Symbolic Links</a:t>
+            </a:r>
+            <a:endParaRPr lang="en-CA" sz="2800" b="0" strike="noStrike" spc="-1" dirty="0">
+              <a:latin typeface="Arial"/>
+            </a:endParaRPr>
+          </a:p>
+        </p:txBody>
+      </p:sp>
+      <p:graphicFrame>
+        <p:nvGraphicFramePr>
+          <p:cNvPr id="7" name="Table 6">
+            <a:extLst>
+              <a:ext uri="{FF2B5EF4-FFF2-40B4-BE49-F238E27FC236}">
+                <a16:creationId xmlns:a16="http://schemas.microsoft.com/office/drawing/2014/main" id="{81F690A0-1E9F-4217-A490-D96122534398}"/>
+              </a:ext>
+            </a:extLst>
+          </p:cNvPr>
+          <p:cNvGraphicFramePr>
+            <a:graphicFrameLocks noGrp="1"/>
+          </p:cNvGraphicFramePr>
+          <p:nvPr>
+            <p:extLst>
+              <p:ext uri="{D42A27DB-BD31-4B8C-83A1-F6EECF244321}">
+                <p14:modId xmlns:p14="http://schemas.microsoft.com/office/powerpoint/2010/main" val="2322364151"/>
+              </p:ext>
+            </p:extLst>
+          </p:nvPr>
+        </p:nvGraphicFramePr>
+        <p:xfrm>
+          <a:off x="1939153" y="2271508"/>
+          <a:ext cx="8626294" cy="2922790"/>
+        </p:xfrm>
+        <a:graphic>
+          <a:graphicData uri="http://schemas.openxmlformats.org/drawingml/2006/table">
+            <a:tbl>
+              <a:tblPr firstRow="1" firstCol="1" bandRow="1">
+                <a:tableStyleId>{5C22544A-7EE6-4342-B048-85BDC9FD1C3A}</a:tableStyleId>
+              </a:tblPr>
+              <a:tblGrid>
+                <a:gridCol w="4313147">
+                  <a:extLst>
+                    <a:ext uri="{9D8B030D-6E8A-4147-A177-3AD203B41FA5}">
+                      <a16:colId xmlns:a16="http://schemas.microsoft.com/office/drawing/2014/main" val="20000"/>
+                    </a:ext>
+                  </a:extLst>
+                </a:gridCol>
+                <a:gridCol w="4313147">
+                  <a:extLst>
+                    <a:ext uri="{9D8B030D-6E8A-4147-A177-3AD203B41FA5}">
+                      <a16:colId xmlns:a16="http://schemas.microsoft.com/office/drawing/2014/main" val="20001"/>
+                    </a:ext>
+                  </a:extLst>
+                </a:gridCol>
+              </a:tblGrid>
+              <a:tr h="265708">
+                <a:tc>
+                  <a:txBody>
+                    <a:bodyPr/>
+                    <a:lstStyle/>
+                    <a:p>
+                      <a:pPr marL="0" marR="0">
+                        <a:spcBef>
+                          <a:spcPts val="0"/>
+                        </a:spcBef>
+                        <a:spcAft>
+                          <a:spcPts val="0"/>
+                        </a:spcAft>
+                      </a:pPr>
+                      <a:r>
+                        <a:rPr lang="en-CA" sz="1700" dirty="0">
+                          <a:effectLst/>
+                        </a:rPr>
+                        <a:t>Hard Link</a:t>
+                      </a:r>
+                      <a:endParaRPr lang="en-US" sz="1700" dirty="0">
+                        <a:effectLst/>
+                        <a:latin typeface="Calibri" panose="020F0502020204030204" pitchFamily="34" charset="0"/>
+                        <a:ea typeface="Calibri" panose="020F0502020204030204" pitchFamily="34" charset="0"/>
+                        <a:cs typeface="Times New Roman" panose="02020603050405020304" pitchFamily="18" charset="0"/>
+                      </a:endParaRPr>
+                    </a:p>
+                  </a:txBody>
+                  <a:tcPr marL="99640" marR="99640" marT="0" marB="0"/>
+                </a:tc>
+                <a:tc>
+                  <a:txBody>
+                    <a:bodyPr/>
+                    <a:lstStyle/>
+                    <a:p>
+                      <a:pPr marL="0" marR="0">
+                        <a:spcBef>
+                          <a:spcPts val="0"/>
+                        </a:spcBef>
+                        <a:spcAft>
+                          <a:spcPts val="0"/>
+                        </a:spcAft>
+                      </a:pPr>
+                      <a:r>
+                        <a:rPr lang="en-CA" sz="1700" dirty="0">
+                          <a:effectLst/>
+                        </a:rPr>
+                        <a:t>Symbolic Link</a:t>
+                      </a:r>
+                      <a:endParaRPr lang="en-US" sz="1700" dirty="0">
+                        <a:effectLst/>
+                        <a:latin typeface="Calibri" panose="020F0502020204030204" pitchFamily="34" charset="0"/>
+                        <a:ea typeface="Calibri" panose="020F0502020204030204" pitchFamily="34" charset="0"/>
+                        <a:cs typeface="Times New Roman" panose="02020603050405020304" pitchFamily="18" charset="0"/>
+                      </a:endParaRPr>
+                    </a:p>
+                  </a:txBody>
+                  <a:tcPr marL="99640" marR="99640" marT="0" marB="0"/>
+                </a:tc>
+                <a:extLst>
+                  <a:ext uri="{0D108BD9-81ED-4DB2-BD59-A6C34878D82A}">
+                    <a16:rowId xmlns:a16="http://schemas.microsoft.com/office/drawing/2014/main" val="10000"/>
+                  </a:ext>
+                </a:extLst>
+              </a:tr>
+              <a:tr h="2657082">
+                <a:tc>
+                  <a:txBody>
+                    <a:bodyPr/>
+                    <a:lstStyle/>
+                    <a:p>
+                      <a:pPr marL="0" marR="0" algn="ctr">
+                        <a:spcBef>
+                          <a:spcPts val="0"/>
+                        </a:spcBef>
+                        <a:spcAft>
+                          <a:spcPts val="0"/>
+                        </a:spcAft>
+                      </a:pPr>
+                      <a:r>
+                        <a:rPr lang="en-CA" sz="1700" dirty="0">
+                          <a:solidFill>
+                            <a:schemeClr val="tx1"/>
+                          </a:solidFill>
+                          <a:effectLst/>
+                        </a:rPr>
+                        <a:t>          inode: 1110214466</a:t>
+                      </a:r>
+                      <a:endParaRPr lang="en-US" sz="1700" dirty="0">
+                        <a:solidFill>
+                          <a:schemeClr val="tx1"/>
+                        </a:solidFill>
+                        <a:effectLst/>
+                      </a:endParaRPr>
+                    </a:p>
+                    <a:p>
+                      <a:pPr marL="0" marR="0">
+                        <a:spcBef>
+                          <a:spcPts val="0"/>
+                        </a:spcBef>
+                        <a:spcAft>
+                          <a:spcPts val="0"/>
+                        </a:spcAft>
+                      </a:pPr>
+                      <a:r>
+                        <a:rPr lang="en-CA" sz="1700" dirty="0">
+                          <a:solidFill>
+                            <a:schemeClr val="tx1"/>
+                          </a:solidFill>
+                          <a:effectLst/>
+                        </a:rPr>
+                        <a:t>                           /                         \</a:t>
+                      </a:r>
+                      <a:endParaRPr lang="en-US" sz="1700" dirty="0">
+                        <a:solidFill>
+                          <a:schemeClr val="tx1"/>
+                        </a:solidFill>
+                        <a:effectLst/>
+                      </a:endParaRPr>
+                    </a:p>
+                    <a:p>
+                      <a:pPr marL="0" marR="0">
+                        <a:spcBef>
+                          <a:spcPts val="0"/>
+                        </a:spcBef>
+                        <a:spcAft>
+                          <a:spcPts val="0"/>
+                        </a:spcAft>
+                      </a:pPr>
+                      <a:r>
+                        <a:rPr lang="en-CA" sz="1700" dirty="0">
+                          <a:solidFill>
+                            <a:schemeClr val="tx1"/>
+                          </a:solidFill>
+                          <a:effectLst/>
+                        </a:rPr>
+                        <a:t>                         /                             \</a:t>
+                      </a:r>
+                      <a:endParaRPr lang="en-US" sz="1700" dirty="0">
+                        <a:solidFill>
+                          <a:schemeClr val="tx1"/>
+                        </a:solidFill>
+                        <a:effectLst/>
+                      </a:endParaRPr>
+                    </a:p>
+                    <a:p>
+                      <a:pPr marL="0" marR="0">
+                        <a:spcBef>
+                          <a:spcPts val="0"/>
+                        </a:spcBef>
+                        <a:spcAft>
+                          <a:spcPts val="0"/>
+                        </a:spcAft>
+                      </a:pPr>
+                      <a:r>
+                        <a:rPr lang="en-CA" sz="1700" dirty="0">
+                          <a:solidFill>
+                            <a:schemeClr val="tx1"/>
+                          </a:solidFill>
+                          <a:effectLst/>
+                        </a:rPr>
+                        <a:t>                       /                                \ ~/very/long/path/file1.txt          ~/file2.txt</a:t>
+                      </a:r>
+                      <a:endParaRPr lang="en-US" sz="1700" dirty="0">
+                        <a:solidFill>
+                          <a:schemeClr val="tx1"/>
+                        </a:solidFill>
+                        <a:effectLst/>
+                        <a:latin typeface="Calibri" panose="020F0502020204030204" pitchFamily="34" charset="0"/>
+                        <a:ea typeface="Calibri" panose="020F0502020204030204" pitchFamily="34" charset="0"/>
+                        <a:cs typeface="Times New Roman" panose="02020603050405020304" pitchFamily="18" charset="0"/>
+                      </a:endParaRPr>
+                    </a:p>
+                  </a:txBody>
+                  <a:tcPr marL="99640" marR="99640" marT="0" marB="0">
+                    <a:noFill/>
+                  </a:tcPr>
+                </a:tc>
+                <a:tc>
+                  <a:txBody>
+                    <a:bodyPr/>
+                    <a:lstStyle/>
+                    <a:p>
+                      <a:pPr marL="0" marR="0" algn="ctr">
+                        <a:spcBef>
+                          <a:spcPts val="0"/>
+                        </a:spcBef>
+                        <a:spcAft>
+                          <a:spcPts val="0"/>
+                        </a:spcAft>
+                      </a:pPr>
+                      <a:r>
+                        <a:rPr lang="en-CA" sz="1700" b="1" dirty="0">
+                          <a:solidFill>
+                            <a:schemeClr val="tx1"/>
+                          </a:solidFill>
+                          <a:effectLst/>
+                        </a:rPr>
+                        <a:t>inode: 1110214466</a:t>
+                      </a:r>
+                      <a:endParaRPr lang="en-US" sz="1700" b="1" dirty="0">
+                        <a:solidFill>
+                          <a:schemeClr val="tx1"/>
+                        </a:solidFill>
+                        <a:effectLst/>
+                      </a:endParaRPr>
+                    </a:p>
+                    <a:p>
+                      <a:pPr marL="0" marR="0" algn="ctr">
+                        <a:spcBef>
+                          <a:spcPts val="0"/>
+                        </a:spcBef>
+                        <a:spcAft>
+                          <a:spcPts val="0"/>
+                        </a:spcAft>
+                      </a:pPr>
+                      <a:r>
+                        <a:rPr lang="en-CA" sz="1700" b="1" dirty="0">
+                          <a:solidFill>
+                            <a:schemeClr val="tx1"/>
+                          </a:solidFill>
+                          <a:effectLst/>
+                        </a:rPr>
+                        <a:t>|</a:t>
+                      </a:r>
+                      <a:endParaRPr lang="en-US" sz="1700" b="1" dirty="0">
+                        <a:solidFill>
+                          <a:schemeClr val="tx1"/>
+                        </a:solidFill>
+                        <a:effectLst/>
+                      </a:endParaRPr>
+                    </a:p>
+                    <a:p>
+                      <a:pPr marL="0" marR="0" algn="ctr">
+                        <a:spcBef>
+                          <a:spcPts val="0"/>
+                        </a:spcBef>
+                        <a:spcAft>
+                          <a:spcPts val="0"/>
+                        </a:spcAft>
+                      </a:pPr>
+                      <a:r>
+                        <a:rPr lang="en-CA" sz="1700" b="1" dirty="0">
+                          <a:solidFill>
+                            <a:schemeClr val="tx1"/>
+                          </a:solidFill>
+                          <a:effectLst/>
+                        </a:rPr>
+                        <a:t>|</a:t>
+                      </a:r>
+                      <a:endParaRPr lang="en-US" sz="1700" b="1" dirty="0">
+                        <a:solidFill>
+                          <a:schemeClr val="tx1"/>
+                        </a:solidFill>
+                        <a:effectLst/>
+                      </a:endParaRPr>
+                    </a:p>
+                    <a:p>
+                      <a:pPr marL="0" marR="0" algn="ctr">
+                        <a:spcBef>
+                          <a:spcPts val="0"/>
+                        </a:spcBef>
+                        <a:spcAft>
+                          <a:spcPts val="0"/>
+                        </a:spcAft>
+                      </a:pPr>
+                      <a:r>
+                        <a:rPr lang="en-CA" sz="1700" b="1" dirty="0">
+                          <a:solidFill>
+                            <a:schemeClr val="tx1"/>
+                          </a:solidFill>
+                          <a:effectLst/>
+                        </a:rPr>
+                        <a:t>V</a:t>
+                      </a:r>
+                      <a:endParaRPr lang="en-US" sz="1700" b="1" dirty="0">
+                        <a:solidFill>
+                          <a:schemeClr val="tx1"/>
+                        </a:solidFill>
+                        <a:effectLst/>
+                      </a:endParaRPr>
+                    </a:p>
+                    <a:p>
+                      <a:pPr marL="0" marR="0" algn="ctr">
+                        <a:spcBef>
+                          <a:spcPts val="0"/>
+                        </a:spcBef>
+                        <a:spcAft>
+                          <a:spcPts val="0"/>
+                        </a:spcAft>
+                      </a:pPr>
+                      <a:r>
+                        <a:rPr lang="en-CA" sz="1700" b="1" dirty="0">
+                          <a:solidFill>
+                            <a:schemeClr val="tx1"/>
+                          </a:solidFill>
+                          <a:effectLst/>
+                        </a:rPr>
+                        <a:t>~/very/long/path/file1.txt</a:t>
+                      </a:r>
+                      <a:endParaRPr lang="en-US" sz="1700" b="1" dirty="0">
+                        <a:solidFill>
+                          <a:schemeClr val="tx1"/>
+                        </a:solidFill>
+                        <a:effectLst/>
+                      </a:endParaRPr>
+                    </a:p>
+                    <a:p>
+                      <a:pPr marL="0" marR="0" algn="ctr">
+                        <a:spcBef>
+                          <a:spcPts val="0"/>
+                        </a:spcBef>
+                        <a:spcAft>
+                          <a:spcPts val="0"/>
+                        </a:spcAft>
+                      </a:pPr>
+                      <a:r>
+                        <a:rPr lang="en-CA" sz="1700" b="1" dirty="0">
+                          <a:solidFill>
+                            <a:schemeClr val="tx1"/>
+                          </a:solidFill>
+                          <a:effectLst/>
+                        </a:rPr>
+                        <a:t>|</a:t>
+                      </a:r>
+                      <a:endParaRPr lang="en-US" sz="1700" b="1" dirty="0">
+                        <a:solidFill>
+                          <a:schemeClr val="tx1"/>
+                        </a:solidFill>
+                        <a:effectLst/>
+                      </a:endParaRPr>
+                    </a:p>
+                    <a:p>
+                      <a:pPr marL="0" marR="0" algn="ctr">
+                        <a:spcBef>
+                          <a:spcPts val="0"/>
+                        </a:spcBef>
+                        <a:spcAft>
+                          <a:spcPts val="0"/>
+                        </a:spcAft>
+                      </a:pPr>
+                      <a:r>
+                        <a:rPr lang="en-CA" sz="1700" b="1" dirty="0">
+                          <a:solidFill>
+                            <a:schemeClr val="tx1"/>
+                          </a:solidFill>
+                          <a:effectLst/>
+                        </a:rPr>
+                        <a:t>|</a:t>
+                      </a:r>
+                      <a:endParaRPr lang="en-US" sz="1700" b="1" dirty="0">
+                        <a:solidFill>
+                          <a:schemeClr val="tx1"/>
+                        </a:solidFill>
+                        <a:effectLst/>
+                      </a:endParaRPr>
+                    </a:p>
+                    <a:p>
+                      <a:pPr marL="0" marR="0" algn="ctr">
+                        <a:spcBef>
+                          <a:spcPts val="0"/>
+                        </a:spcBef>
+                        <a:spcAft>
+                          <a:spcPts val="0"/>
+                        </a:spcAft>
+                      </a:pPr>
+                      <a:r>
+                        <a:rPr lang="en-CA" sz="1700" b="1" dirty="0">
+                          <a:solidFill>
+                            <a:schemeClr val="tx1"/>
+                          </a:solidFill>
+                          <a:effectLst/>
+                        </a:rPr>
+                        <a:t>V</a:t>
+                      </a:r>
+                      <a:endParaRPr lang="en-US" sz="1700" b="1" dirty="0">
+                        <a:solidFill>
+                          <a:schemeClr val="tx1"/>
+                        </a:solidFill>
+                        <a:effectLst/>
+                      </a:endParaRPr>
+                    </a:p>
+                    <a:p>
+                      <a:pPr marL="0" marR="0" algn="ctr">
+                        <a:spcBef>
+                          <a:spcPts val="0"/>
+                        </a:spcBef>
+                        <a:spcAft>
+                          <a:spcPts val="0"/>
+                        </a:spcAft>
+                      </a:pPr>
+                      <a:r>
+                        <a:rPr lang="en-CA" sz="1700" b="1" dirty="0">
+                          <a:solidFill>
+                            <a:schemeClr val="tx1"/>
+                          </a:solidFill>
+                          <a:effectLst/>
+                        </a:rPr>
+                        <a:t>~/file2.txt</a:t>
+                      </a:r>
+                      <a:endParaRPr lang="en-US" sz="1700" b="1" dirty="0">
+                        <a:solidFill>
+                          <a:schemeClr val="tx1"/>
+                        </a:solidFill>
+                        <a:effectLst/>
+                      </a:endParaRPr>
+                    </a:p>
+                    <a:p>
+                      <a:pPr marL="0" marR="0">
+                        <a:spcBef>
+                          <a:spcPts val="0"/>
+                        </a:spcBef>
+                        <a:spcAft>
+                          <a:spcPts val="0"/>
+                        </a:spcAft>
+                      </a:pPr>
+                      <a:r>
+                        <a:rPr lang="en-CA" sz="1700" dirty="0">
+                          <a:effectLst/>
+                        </a:rPr>
+                        <a:t> </a:t>
+                      </a:r>
+                      <a:endParaRPr lang="en-US" sz="1700" dirty="0">
+                        <a:effectLst/>
+                        <a:latin typeface="Calibri" panose="020F0502020204030204" pitchFamily="34" charset="0"/>
+                        <a:ea typeface="Calibri" panose="020F0502020204030204" pitchFamily="34" charset="0"/>
+                        <a:cs typeface="Times New Roman" panose="02020603050405020304" pitchFamily="18" charset="0"/>
+                      </a:endParaRPr>
+                    </a:p>
+                  </a:txBody>
+                  <a:tcPr marL="99640" marR="99640" marT="0" marB="0">
+                    <a:noFill/>
+                  </a:tcPr>
+                </a:tc>
+                <a:extLst>
+                  <a:ext uri="{0D108BD9-81ED-4DB2-BD59-A6C34878D82A}">
+                    <a16:rowId xmlns:a16="http://schemas.microsoft.com/office/drawing/2014/main" val="10001"/>
+                  </a:ext>
+                </a:extLst>
+              </a:tr>
+            </a:tbl>
+          </a:graphicData>
+        </a:graphic>
+      </p:graphicFrame>
     </p:spTree>
     <p:extLst>
       <p:ext uri="{BB962C8B-B14F-4D97-AF65-F5344CB8AC3E}">
-        <p14:creationId xmlns:p14="http://schemas.microsoft.com/office/powerpoint/2010/main" val="2613268347"/>
+        <p14:creationId xmlns:p14="http://schemas.microsoft.com/office/powerpoint/2010/main" val="4190145606"/>
       </p:ext>
     </p:extLst>
   </p:cSld>
@@ -8002,7 +8275,79 @@
   <p:timing>
     <p:tnLst>
       <p:par>
-        <p:cTn id="1" dur="indefinite" restart="never" nodeType="tmRoot"/>
+        <p:cTn id="1" dur="indefinite" restart="never" nodeType="tmRoot">
+          <p:childTnLst>
+            <p:seq>
+              <p:cTn id="2" dur="indefinite" nodeType="mainSeq">
+                <p:childTnLst>
+                  <p:par>
+                    <p:cTn id="3" fill="hold">
+                      <p:stCondLst>
+                        <p:cond delay="0"/>
+                      </p:stCondLst>
+                      <p:childTnLst>
+                        <p:par>
+                          <p:cTn id="4" fill="hold">
+                            <p:stCondLst>
+                              <p:cond delay="0"/>
+                            </p:stCondLst>
+                            <p:childTnLst>
+                              <p:par>
+                                <p:cTn id="5" presetID="1" presetClass="entr" fill="hold" nodeType="withEffect">
+                                  <p:stCondLst>
+                                    <p:cond delay="0"/>
+                                  </p:stCondLst>
+                                  <p:childTnLst>
+                                    <p:set>
+                                      <p:cBhvr>
+                                        <p:cTn id="6" dur="1" fill="hold">
+                                          <p:stCondLst>
+                                            <p:cond delay="0"/>
+                                          </p:stCondLst>
+                                        </p:cTn>
+                                        <p:tgtEl>
+                                          <p:spTgt spid="228">
+                                            <p:txEl>
+                                              <p:pRg st="0" end="0"/>
+                                            </p:txEl>
+                                          </p:spTgt>
+                                        </p:tgtEl>
+                                        <p:attrNameLst>
+                                          <p:attrName>style.visibility</p:attrName>
+                                        </p:attrNameLst>
+                                      </p:cBhvr>
+                                      <p:to>
+                                        <p:strVal val="visible"/>
+                                      </p:to>
+                                    </p:set>
+                                  </p:childTnLst>
+                                </p:cTn>
+                              </p:par>
+                            </p:childTnLst>
+                          </p:cTn>
+                        </p:par>
+                      </p:childTnLst>
+                    </p:cTn>
+                  </p:par>
+                </p:childTnLst>
+              </p:cTn>
+              <p:prevCondLst>
+                <p:cond evt="onPrev" delay="0">
+                  <p:tgtEl>
+                    <p:sldTgt/>
+                  </p:tgtEl>
+                </p:cond>
+              </p:prevCondLst>
+              <p:nextCondLst>
+                <p:cond evt="onNext" delay="0">
+                  <p:tgtEl>
+                    <p:sldTgt/>
+                  </p:tgtEl>
+                </p:cond>
+              </p:nextCondLst>
+            </p:seq>
+          </p:childTnLst>
+        </p:cTn>
       </p:par>
     </p:tnLst>
   </p:timing>
@@ -8053,6 +8398,7 @@
               <a:rPr lang="en-US" sz="2800" dirty="0"/>
               <a:t>Linking files</a:t>
             </a:r>
+            <a:endParaRPr lang="en-US" sz="3000" dirty="0"/>
           </a:p>
         </p:txBody>
       </p:sp>
@@ -8074,13 +8420,13 @@
         </p:nvSpPr>
         <p:spPr>
           <a:xfrm>
-            <a:off x="1451578" y="1706813"/>
-            <a:ext cx="8413391" cy="4755771"/>
+            <a:off x="1451579" y="1329136"/>
+            <a:ext cx="6879623" cy="4755771"/>
           </a:xfrm>
         </p:spPr>
         <p:txBody>
           <a:bodyPr>
-            <a:normAutofit/>
+            <a:normAutofit fontScale="92500" lnSpcReduction="10000"/>
           </a:bodyPr>
           <a:lstStyle/>
           <a:p>
@@ -8088,47 +8434,257 @@
               <a:buNone/>
             </a:pPr>
             <a:r>
-              <a:rPr lang="en-CA" sz="2400" b="1" dirty="0"/>
-              <a:t>Instructor Demonstration</a:t>
-            </a:r>
+              <a:rPr lang="en-CA" sz="3400" b="1" dirty="0"/>
+              <a:t>Symbolic Links</a:t>
+            </a:r>
+            <a:endParaRPr lang="en-CA" b="1" dirty="0"/>
           </a:p>
           <a:p>
             <a:pPr marL="0" indent="0">
               <a:buNone/>
             </a:pPr>
             <a:r>
-              <a:rPr lang="en-CA" dirty="0"/>
-              <a:t>Your instructor will now demonstrate how to create </a:t>
-            </a:r>
-            <a:r>
-              <a:rPr lang="en-CA" b="1" dirty="0"/>
-              <a:t>Symbolic (Soft) links</a:t>
-            </a:r>
-            <a:r>
-              <a:rPr lang="en-CA" dirty="0"/>
-              <a:t>.</a:t>
-            </a:r>
-            <a:r>
-              <a:rPr lang="en-CA" sz="1200" dirty="0"/>
-              <a:t/>
+              <a:rPr lang="en-CA" i="1" dirty="0"/>
+              <a:t>Examples:</a:t>
+            </a:r>
+            <a:endParaRPr lang="en-CA" dirty="0"/>
+          </a:p>
+          <a:p>
+            <a:pPr marL="0" indent="0">
+              <a:buNone/>
+            </a:pPr>
+            <a:r>
+              <a:rPr lang="en-CA" sz="1800" b="1" dirty="0">
+                <a:solidFill>
+                  <a:srgbClr val="0070C0"/>
+                </a:solidFill>
+                <a:latin typeface="Courier New" panose="02070309020205020404" pitchFamily="49" charset="0"/>
+                <a:cs typeface="Courier New" panose="02070309020205020404" pitchFamily="49" charset="0"/>
+              </a:rPr>
+              <a:t>touch </a:t>
+            </a:r>
+            <a:r>
+              <a:rPr lang="en-CA" sz="1800" b="1" dirty="0" err="1">
+                <a:solidFill>
+                  <a:srgbClr val="0070C0"/>
+                </a:solidFill>
+                <a:latin typeface="Courier New" panose="02070309020205020404" pitchFamily="49" charset="0"/>
+                <a:cs typeface="Courier New" panose="02070309020205020404" pitchFamily="49" charset="0"/>
+              </a:rPr>
+              <a:t>otherfile.txt</a:t>
             </a:r>
             <a:br>
-              <a:rPr lang="en-CA" sz="1200" dirty="0"/>
+              <a:rPr lang="en-CA" sz="1800" b="1" dirty="0">
+                <a:solidFill>
+                  <a:srgbClr val="0070C0"/>
+                </a:solidFill>
+                <a:latin typeface="Courier New" panose="02070309020205020404" pitchFamily="49" charset="0"/>
+                <a:cs typeface="Courier New" panose="02070309020205020404" pitchFamily="49" charset="0"/>
+              </a:rPr>
             </a:br>
             <a:r>
-              <a:rPr lang="en-CA" sz="1200" dirty="0"/>
-              <a:t/>
+              <a:rPr lang="en-CA" sz="1800" b="1" dirty="0">
+                <a:solidFill>
+                  <a:srgbClr val="0070C0"/>
+                </a:solidFill>
+                <a:latin typeface="Courier New" panose="02070309020205020404" pitchFamily="49" charset="0"/>
+                <a:cs typeface="Courier New" panose="02070309020205020404" pitchFamily="49" charset="0"/>
+              </a:rPr>
+              <a:t>ln -s </a:t>
+            </a:r>
+            <a:r>
+              <a:rPr lang="en-CA" sz="1800" b="1" dirty="0" err="1">
+                <a:solidFill>
+                  <a:srgbClr val="0070C0"/>
+                </a:solidFill>
+                <a:latin typeface="Courier New" panose="02070309020205020404" pitchFamily="49" charset="0"/>
+                <a:cs typeface="Courier New" panose="02070309020205020404" pitchFamily="49" charset="0"/>
+              </a:rPr>
+              <a:t>otherfile.txt</a:t>
+            </a:r>
+            <a:r>
+              <a:rPr lang="en-CA" sz="1800" b="1" dirty="0">
+                <a:solidFill>
+                  <a:srgbClr val="0070C0"/>
+                </a:solidFill>
+                <a:latin typeface="Courier New" panose="02070309020205020404" pitchFamily="49" charset="0"/>
+                <a:cs typeface="Courier New" panose="02070309020205020404" pitchFamily="49" charset="0"/>
+              </a:rPr>
+              <a:t> otherfile1.sym.lnk</a:t>
             </a:r>
             <a:br>
-              <a:rPr lang="en-CA" sz="1200" dirty="0"/>
+              <a:rPr lang="en-CA" sz="1800" b="1" dirty="0">
+                <a:solidFill>
+                  <a:srgbClr val="0070C0"/>
+                </a:solidFill>
+                <a:latin typeface="Courier New" panose="02070309020205020404" pitchFamily="49" charset="0"/>
+                <a:cs typeface="Courier New" panose="02070309020205020404" pitchFamily="49" charset="0"/>
+              </a:rPr>
             </a:br>
-            <a:endParaRPr lang="en-CA" sz="1200" dirty="0"/>
-          </a:p>
-          <a:p>
-            <a:endParaRPr lang="en-CA" sz="2400" dirty="0"/>
-          </a:p>
-          <a:p>
-            <a:endParaRPr lang="en-CA" sz="2400" dirty="0"/>
+            <a:r>
+              <a:rPr lang="en-CA" sz="1800" b="1" dirty="0">
+                <a:solidFill>
+                  <a:srgbClr val="0070C0"/>
+                </a:solidFill>
+                <a:latin typeface="Courier New" panose="02070309020205020404" pitchFamily="49" charset="0"/>
+                <a:cs typeface="Courier New" panose="02070309020205020404" pitchFamily="49" charset="0"/>
+              </a:rPr>
+              <a:t>ln -s </a:t>
+            </a:r>
+            <a:r>
+              <a:rPr lang="en-CA" sz="1800" b="1" dirty="0" err="1">
+                <a:solidFill>
+                  <a:srgbClr val="0070C0"/>
+                </a:solidFill>
+                <a:latin typeface="Courier New" panose="02070309020205020404" pitchFamily="49" charset="0"/>
+                <a:cs typeface="Courier New" panose="02070309020205020404" pitchFamily="49" charset="0"/>
+              </a:rPr>
+              <a:t>otherfile.txt</a:t>
+            </a:r>
+            <a:r>
+              <a:rPr lang="en-CA" sz="1800" b="1" dirty="0">
+                <a:solidFill>
+                  <a:srgbClr val="0070C0"/>
+                </a:solidFill>
+                <a:latin typeface="Courier New" panose="02070309020205020404" pitchFamily="49" charset="0"/>
+                <a:cs typeface="Courier New" panose="02070309020205020404" pitchFamily="49" charset="0"/>
+              </a:rPr>
+              <a:t> otherfile2.sym.lnk</a:t>
+            </a:r>
+            <a:br>
+              <a:rPr lang="en-CA" sz="1800" b="1" dirty="0">
+                <a:solidFill>
+                  <a:srgbClr val="0070C0"/>
+                </a:solidFill>
+                <a:latin typeface="Courier New" panose="02070309020205020404" pitchFamily="49" charset="0"/>
+                <a:cs typeface="Courier New" panose="02070309020205020404" pitchFamily="49" charset="0"/>
+              </a:rPr>
+            </a:br>
+            <a:r>
+              <a:rPr lang="en-CA" sz="1800" b="1" dirty="0">
+                <a:solidFill>
+                  <a:srgbClr val="0070C0"/>
+                </a:solidFill>
+                <a:latin typeface="Courier New" panose="02070309020205020404" pitchFamily="49" charset="0"/>
+                <a:cs typeface="Courier New" panose="02070309020205020404" pitchFamily="49" charset="0"/>
+              </a:rPr>
+              <a:t>ln -s </a:t>
+            </a:r>
+            <a:r>
+              <a:rPr lang="en-CA" sz="1800" b="1" dirty="0" err="1">
+                <a:solidFill>
+                  <a:srgbClr val="0070C0"/>
+                </a:solidFill>
+                <a:latin typeface="Courier New" panose="02070309020205020404" pitchFamily="49" charset="0"/>
+                <a:cs typeface="Courier New" panose="02070309020205020404" pitchFamily="49" charset="0"/>
+              </a:rPr>
+              <a:t>otherfile.txt</a:t>
+            </a:r>
+            <a:r>
+              <a:rPr lang="en-CA" sz="1800" b="1" dirty="0">
+                <a:solidFill>
+                  <a:srgbClr val="0070C0"/>
+                </a:solidFill>
+                <a:latin typeface="Courier New" panose="02070309020205020404" pitchFamily="49" charset="0"/>
+                <a:cs typeface="Courier New" panose="02070309020205020404" pitchFamily="49" charset="0"/>
+              </a:rPr>
+              <a:t> ~/backups/</a:t>
+            </a:r>
+            <a:r>
+              <a:rPr lang="en-CA" sz="1800" b="1" dirty="0" err="1">
+                <a:solidFill>
+                  <a:srgbClr val="0070C0"/>
+                </a:solidFill>
+                <a:latin typeface="Courier New" panose="02070309020205020404" pitchFamily="49" charset="0"/>
+                <a:cs typeface="Courier New" panose="02070309020205020404" pitchFamily="49" charset="0"/>
+              </a:rPr>
+              <a:t>otherfile.sym.lnk</a:t>
+            </a:r>
+            <a:br>
+              <a:rPr lang="en-CA" sz="1800" b="1" dirty="0">
+                <a:solidFill>
+                  <a:srgbClr val="0070C0"/>
+                </a:solidFill>
+                <a:latin typeface="Courier New" panose="02070309020205020404" pitchFamily="49" charset="0"/>
+                <a:cs typeface="Courier New" panose="02070309020205020404" pitchFamily="49" charset="0"/>
+              </a:rPr>
+            </a:br>
+            <a:r>
+              <a:rPr lang="en-CA" sz="1800" b="1" dirty="0">
+                <a:solidFill>
+                  <a:srgbClr val="0070C0"/>
+                </a:solidFill>
+                <a:latin typeface="Courier New" panose="02070309020205020404" pitchFamily="49" charset="0"/>
+                <a:cs typeface="Courier New" panose="02070309020205020404" pitchFamily="49" charset="0"/>
+              </a:rPr>
+              <a:t>ls –li </a:t>
+            </a:r>
+            <a:r>
+              <a:rPr lang="en-CA" sz="1800" b="1" dirty="0" err="1">
+                <a:solidFill>
+                  <a:srgbClr val="0070C0"/>
+                </a:solidFill>
+                <a:latin typeface="Courier New" panose="02070309020205020404" pitchFamily="49" charset="0"/>
+                <a:cs typeface="Courier New" panose="02070309020205020404" pitchFamily="49" charset="0"/>
+              </a:rPr>
+              <a:t>otherfile</a:t>
+            </a:r>
+            <a:r>
+              <a:rPr lang="en-CA" sz="1800" b="1" dirty="0">
+                <a:solidFill>
+                  <a:srgbClr val="0070C0"/>
+                </a:solidFill>
+                <a:latin typeface="Courier New" panose="02070309020205020404" pitchFamily="49" charset="0"/>
+                <a:cs typeface="Courier New" panose="02070309020205020404" pitchFamily="49" charset="0"/>
+              </a:rPr>
+              <a:t>*</a:t>
+            </a:r>
+            <a:br>
+              <a:rPr lang="en-CA" sz="1800" b="1" dirty="0">
+                <a:latin typeface="Courier New" panose="02070309020205020404" pitchFamily="49" charset="0"/>
+                <a:cs typeface="Courier New" panose="02070309020205020404" pitchFamily="49" charset="0"/>
+              </a:rPr>
+            </a:br>
+            <a:br>
+              <a:rPr lang="en-CA" sz="1800" b="1" dirty="0">
+                <a:latin typeface="Courier New" panose="02070309020205020404" pitchFamily="49" charset="0"/>
+                <a:cs typeface="Courier New" panose="02070309020205020404" pitchFamily="49" charset="0"/>
+              </a:rPr>
+            </a:br>
+            <a:br>
+              <a:rPr lang="en-CA" sz="1800" b="1" dirty="0">
+                <a:latin typeface="Courier New" panose="02070309020205020404" pitchFamily="49" charset="0"/>
+                <a:cs typeface="Courier New" panose="02070309020205020404" pitchFamily="49" charset="0"/>
+              </a:rPr>
+            </a:br>
+            <a:br>
+              <a:rPr lang="en-CA" sz="1800" b="1" dirty="0">
+                <a:latin typeface="Courier New" panose="02070309020205020404" pitchFamily="49" charset="0"/>
+                <a:cs typeface="Courier New" panose="02070309020205020404" pitchFamily="49" charset="0"/>
+              </a:rPr>
+            </a:br>
+            <a:br>
+              <a:rPr lang="en-CA" sz="1800" b="1" dirty="0">
+                <a:latin typeface="Courier New" panose="02070309020205020404" pitchFamily="49" charset="0"/>
+                <a:cs typeface="Courier New" panose="02070309020205020404" pitchFamily="49" charset="0"/>
+              </a:rPr>
+            </a:br>
+            <a:br>
+              <a:rPr lang="en-CA" sz="1800" b="1" dirty="0">
+                <a:latin typeface="Courier New" panose="02070309020205020404" pitchFamily="49" charset="0"/>
+                <a:cs typeface="Courier New" panose="02070309020205020404" pitchFamily="49" charset="0"/>
+              </a:rPr>
+            </a:br>
+            <a:br>
+              <a:rPr lang="en-CA" sz="1800" b="1" dirty="0">
+                <a:latin typeface="Courier New" panose="02070309020205020404" pitchFamily="49" charset="0"/>
+                <a:cs typeface="Courier New" panose="02070309020205020404" pitchFamily="49" charset="0"/>
+              </a:rPr>
+            </a:br>
+            <a:endParaRPr lang="en-CA" sz="1800" dirty="0">
+              <a:latin typeface="Courier New" panose="02070309020205020404" pitchFamily="49" charset="0"/>
+              <a:cs typeface="Courier New" panose="02070309020205020404" pitchFamily="49" charset="0"/>
+            </a:endParaRPr>
           </a:p>
           <a:p>
             <a:pPr marL="0" indent="0">
@@ -8140,10 +8696,10 @@
       </p:sp>
       <p:pic>
         <p:nvPicPr>
-          <p:cNvPr id="4" name="Picture 3" descr="A picture containing drawing&#10;&#10;Description automatically generated">
+          <p:cNvPr id="8" name="Picture 7" descr="A screenshot of a cell phone&#10;&#10;Description automatically generated">
             <a:extLst>
               <a:ext uri="{FF2B5EF4-FFF2-40B4-BE49-F238E27FC236}">
-                <a16:creationId xmlns:a16="http://schemas.microsoft.com/office/drawing/2014/main" id="{8CD1DF9A-A995-1E4A-97CD-6982D99AF322}"/>
+                <a16:creationId xmlns:a16="http://schemas.microsoft.com/office/drawing/2014/main" id="{B6AC8B3C-7566-B247-8859-2C6805F2E5AD}"/>
               </a:ext>
             </a:extLst>
           </p:cNvPr>
@@ -8153,153 +8709,36 @@
           <p:nvPr/>
         </p:nvPicPr>
         <p:blipFill>
-          <a:blip r:embed="rId2">
-            <a:extLst>
-              <a:ext uri="{837473B0-CC2E-450A-ABE3-18F120FF3D39}">
-                <a1611:picAttrSrcUrl xmlns="" xmlns:a1611="http://schemas.microsoft.com/office/drawing/2016/11/main" r:id="rId3"/>
-              </a:ext>
-            </a:extLst>
-          </a:blip>
+          <a:blip r:embed="rId2"/>
           <a:stretch>
             <a:fillRect/>
           </a:stretch>
         </p:blipFill>
         <p:spPr>
           <a:xfrm>
-            <a:off x="10135411" y="975969"/>
-            <a:ext cx="1210020" cy="1210020"/>
+            <a:off x="2342361" y="4246258"/>
+            <a:ext cx="7507277" cy="1918614"/>
           </a:xfrm>
           <a:prstGeom prst="rect">
             <a:avLst/>
           </a:prstGeom>
+          <a:ln>
+            <a:solidFill>
+              <a:schemeClr val="tx1"/>
+            </a:solidFill>
+          </a:ln>
         </p:spPr>
       </p:pic>
     </p:spTree>
     <p:extLst>
       <p:ext uri="{BB962C8B-B14F-4D97-AF65-F5344CB8AC3E}">
-        <p14:creationId xmlns:p14="http://schemas.microsoft.com/office/powerpoint/2010/main" val="2926248848"/>
+        <p14:creationId xmlns:p14="http://schemas.microsoft.com/office/powerpoint/2010/main" val="2613268347"/>
       </p:ext>
     </p:extLst>
   </p:cSld>
   <p:clrMapOvr>
     <a:masterClrMapping/>
   </p:clrMapOvr>
-  <p:timing>
-    <p:tnLst>
-      <p:par>
-        <p:cTn id="1" dur="indefinite" restart="never" nodeType="tmRoot">
-          <p:childTnLst>
-            <p:seq concurrent="1" nextAc="seek">
-              <p:cTn id="2" dur="indefinite" nodeType="mainSeq">
-                <p:childTnLst>
-                  <p:par>
-                    <p:cTn id="3" fill="hold">
-                      <p:stCondLst>
-                        <p:cond delay="indefinite"/>
-                        <p:cond evt="onBegin" delay="0">
-                          <p:tn val="2"/>
-                        </p:cond>
-                      </p:stCondLst>
-                      <p:childTnLst>
-                        <p:par>
-                          <p:cTn id="4" fill="hold">
-                            <p:stCondLst>
-                              <p:cond delay="0"/>
-                            </p:stCondLst>
-                            <p:childTnLst>
-                              <p:par>
-                                <p:cTn id="5" presetID="1" presetClass="entr" presetSubtype="0" fill="hold" grpId="0" nodeType="withEffect">
-                                  <p:stCondLst>
-                                    <p:cond delay="0"/>
-                                  </p:stCondLst>
-                                  <p:childTnLst>
-                                    <p:set>
-                                      <p:cBhvr>
-                                        <p:cTn id="6" dur="1" fill="hold">
-                                          <p:stCondLst>
-                                            <p:cond delay="0"/>
-                                          </p:stCondLst>
-                                        </p:cTn>
-                                        <p:tgtEl>
-                                          <p:spTgt spid="3">
-                                            <p:txEl>
-                                              <p:pRg st="0" end="0"/>
-                                            </p:txEl>
-                                          </p:spTgt>
-                                        </p:tgtEl>
-                                        <p:attrNameLst>
-                                          <p:attrName>style.visibility</p:attrName>
-                                        </p:attrNameLst>
-                                      </p:cBhvr>
-                                      <p:to>
-                                        <p:strVal val="visible"/>
-                                      </p:to>
-                                    </p:set>
-                                  </p:childTnLst>
-                                </p:cTn>
-                              </p:par>
-                              <p:par>
-                                <p:cTn id="7" presetID="1" presetClass="entr" presetSubtype="0" fill="hold" grpId="0" nodeType="withEffect">
-                                  <p:stCondLst>
-                                    <p:cond delay="0"/>
-                                  </p:stCondLst>
-                                  <p:childTnLst>
-                                    <p:set>
-                                      <p:cBhvr>
-                                        <p:cTn id="8" dur="1" fill="hold">
-                                          <p:stCondLst>
-                                            <p:cond delay="0"/>
-                                          </p:stCondLst>
-                                        </p:cTn>
-                                        <p:tgtEl>
-                                          <p:spTgt spid="3">
-                                            <p:txEl>
-                                              <p:pRg st="1" end="1"/>
-                                            </p:txEl>
-                                          </p:spTgt>
-                                        </p:tgtEl>
-                                        <p:attrNameLst>
-                                          <p:attrName>style.visibility</p:attrName>
-                                        </p:attrNameLst>
-                                      </p:cBhvr>
-                                      <p:to>
-                                        <p:strVal val="visible"/>
-                                      </p:to>
-                                    </p:set>
-                                  </p:childTnLst>
-                                </p:cTn>
-                              </p:par>
-                            </p:childTnLst>
-                          </p:cTn>
-                        </p:par>
-                      </p:childTnLst>
-                    </p:cTn>
-                  </p:par>
-                </p:childTnLst>
-              </p:cTn>
-              <p:prevCondLst>
-                <p:cond evt="onPrev" delay="0">
-                  <p:tgtEl>
-                    <p:sldTgt/>
-                  </p:tgtEl>
-                </p:cond>
-              </p:prevCondLst>
-              <p:nextCondLst>
-                <p:cond evt="onNext" delay="0">
-                  <p:tgtEl>
-                    <p:sldTgt/>
-                  </p:tgtEl>
-                </p:cond>
-              </p:nextCondLst>
-            </p:seq>
-          </p:childTnLst>
-        </p:cTn>
-      </p:par>
-    </p:tnLst>
-    <p:bldLst>
-      <p:bldP spid="3" grpId="0" uiExpand="1" build="p"/>
-    </p:bldLst>
-  </p:timing>
 </p:sld>
 </file>
 

</xml_diff>